<commit_message>
With GG's permission - fixed diagram size, corrected SDC examples, corrected SDC extension references
git-svn-id: http://gforge.hl7.org/svn/fhir/trunk/build@5144 2f0db536-2c49-4257-a3fa-e771ed206c19
</commit_message>
<xml_diff>
--- a/images/source/sdc-generic-workflow.pptx
+++ b/images/source/sdc-generic-workflow.pptx
@@ -7,13 +7,13 @@
   <p:sldIdLst>
     <p:sldId id="256" r:id="rId5"/>
   </p:sldIdLst>
-  <p:sldSz cx="6661150" cy="8821738"/>
+  <p:sldSz cx="6480175" cy="8640763"/>
   <p:notesSz cx="6858000" cy="9144000"/>
   <p:defaultTextStyle>
     <a:defPPr>
       <a:defRPr lang="en-US"/>
     </a:defPPr>
-    <a:lvl1pPr marL="0" algn="l" defTabSz="818617" rtl="0" eaLnBrk="1" latinLnBrk="0" hangingPunct="1">
+    <a:lvl1pPr marL="0" algn="l" defTabSz="799276" rtl="0" eaLnBrk="1" latinLnBrk="0" hangingPunct="1">
       <a:defRPr sz="1600" kern="1200">
         <a:solidFill>
           <a:schemeClr val="tx1"/>
@@ -23,7 +23,7 @@
         <a:cs typeface="+mn-cs"/>
       </a:defRPr>
     </a:lvl1pPr>
-    <a:lvl2pPr marL="409308" algn="l" defTabSz="818617" rtl="0" eaLnBrk="1" latinLnBrk="0" hangingPunct="1">
+    <a:lvl2pPr marL="399637" algn="l" defTabSz="799276" rtl="0" eaLnBrk="1" latinLnBrk="0" hangingPunct="1">
       <a:defRPr sz="1600" kern="1200">
         <a:solidFill>
           <a:schemeClr val="tx1"/>
@@ -33,7 +33,7 @@
         <a:cs typeface="+mn-cs"/>
       </a:defRPr>
     </a:lvl2pPr>
-    <a:lvl3pPr marL="818617" algn="l" defTabSz="818617" rtl="0" eaLnBrk="1" latinLnBrk="0" hangingPunct="1">
+    <a:lvl3pPr marL="799276" algn="l" defTabSz="799276" rtl="0" eaLnBrk="1" latinLnBrk="0" hangingPunct="1">
       <a:defRPr sz="1600" kern="1200">
         <a:solidFill>
           <a:schemeClr val="tx1"/>
@@ -43,7 +43,7 @@
         <a:cs typeface="+mn-cs"/>
       </a:defRPr>
     </a:lvl3pPr>
-    <a:lvl4pPr marL="1227924" algn="l" defTabSz="818617" rtl="0" eaLnBrk="1" latinLnBrk="0" hangingPunct="1">
+    <a:lvl4pPr marL="1198911" algn="l" defTabSz="799276" rtl="0" eaLnBrk="1" latinLnBrk="0" hangingPunct="1">
       <a:defRPr sz="1600" kern="1200">
         <a:solidFill>
           <a:schemeClr val="tx1"/>
@@ -53,7 +53,7 @@
         <a:cs typeface="+mn-cs"/>
       </a:defRPr>
     </a:lvl4pPr>
-    <a:lvl5pPr marL="1637232" algn="l" defTabSz="818617" rtl="0" eaLnBrk="1" latinLnBrk="0" hangingPunct="1">
+    <a:lvl5pPr marL="1598547" algn="l" defTabSz="799276" rtl="0" eaLnBrk="1" latinLnBrk="0" hangingPunct="1">
       <a:defRPr sz="1600" kern="1200">
         <a:solidFill>
           <a:schemeClr val="tx1"/>
@@ -63,7 +63,7 @@
         <a:cs typeface="+mn-cs"/>
       </a:defRPr>
     </a:lvl5pPr>
-    <a:lvl6pPr marL="2046541" algn="l" defTabSz="818617" rtl="0" eaLnBrk="1" latinLnBrk="0" hangingPunct="1">
+    <a:lvl6pPr marL="1998185" algn="l" defTabSz="799276" rtl="0" eaLnBrk="1" latinLnBrk="0" hangingPunct="1">
       <a:defRPr sz="1600" kern="1200">
         <a:solidFill>
           <a:schemeClr val="tx1"/>
@@ -73,7 +73,7 @@
         <a:cs typeface="+mn-cs"/>
       </a:defRPr>
     </a:lvl6pPr>
-    <a:lvl7pPr marL="2455849" algn="l" defTabSz="818617" rtl="0" eaLnBrk="1" latinLnBrk="0" hangingPunct="1">
+    <a:lvl7pPr marL="2397823" algn="l" defTabSz="799276" rtl="0" eaLnBrk="1" latinLnBrk="0" hangingPunct="1">
       <a:defRPr sz="1600" kern="1200">
         <a:solidFill>
           <a:schemeClr val="tx1"/>
@@ -83,7 +83,7 @@
         <a:cs typeface="+mn-cs"/>
       </a:defRPr>
     </a:lvl7pPr>
-    <a:lvl8pPr marL="2865158" algn="l" defTabSz="818617" rtl="0" eaLnBrk="1" latinLnBrk="0" hangingPunct="1">
+    <a:lvl8pPr marL="2797462" algn="l" defTabSz="799276" rtl="0" eaLnBrk="1" latinLnBrk="0" hangingPunct="1">
       <a:defRPr sz="1600" kern="1200">
         <a:solidFill>
           <a:schemeClr val="tx1"/>
@@ -93,7 +93,7 @@
         <a:cs typeface="+mn-cs"/>
       </a:defRPr>
     </a:lvl8pPr>
-    <a:lvl9pPr marL="3274465" algn="l" defTabSz="818617" rtl="0" eaLnBrk="1" latinLnBrk="0" hangingPunct="1">
+    <a:lvl9pPr marL="3197096" algn="l" defTabSz="799276" rtl="0" eaLnBrk="1" latinLnBrk="0" hangingPunct="1">
       <a:defRPr sz="1600" kern="1200">
         <a:solidFill>
           <a:schemeClr val="tx1"/>
@@ -136,8 +136,8 @@
         </p:nvSpPr>
         <p:spPr>
           <a:xfrm>
-            <a:off x="499587" y="2740461"/>
-            <a:ext cx="5661977" cy="1890955"/>
+            <a:off x="486016" y="2684244"/>
+            <a:ext cx="5508150" cy="1852162"/>
           </a:xfrm>
         </p:spPr>
         <p:txBody>
@@ -164,8 +164,8 @@
         </p:nvSpPr>
         <p:spPr>
           <a:xfrm>
-            <a:off x="999175" y="4998987"/>
-            <a:ext cx="4662806" cy="2254445"/>
+            <a:off x="972028" y="4896436"/>
+            <a:ext cx="4536123" cy="2208197"/>
           </a:xfrm>
         </p:spPr>
         <p:txBody>
@@ -181,7 +181,7 @@
                 </a:solidFill>
               </a:defRPr>
             </a:lvl1pPr>
-            <a:lvl2pPr marL="409308" indent="0" algn="ctr">
+            <a:lvl2pPr marL="399637" indent="0" algn="ctr">
               <a:buNone/>
               <a:defRPr>
                 <a:solidFill>
@@ -191,7 +191,7 @@
                 </a:solidFill>
               </a:defRPr>
             </a:lvl2pPr>
-            <a:lvl3pPr marL="818617" indent="0" algn="ctr">
+            <a:lvl3pPr marL="799276" indent="0" algn="ctr">
               <a:buNone/>
               <a:defRPr>
                 <a:solidFill>
@@ -201,7 +201,7 @@
                 </a:solidFill>
               </a:defRPr>
             </a:lvl3pPr>
-            <a:lvl4pPr marL="1227924" indent="0" algn="ctr">
+            <a:lvl4pPr marL="1198911" indent="0" algn="ctr">
               <a:buNone/>
               <a:defRPr>
                 <a:solidFill>
@@ -211,7 +211,7 @@
                 </a:solidFill>
               </a:defRPr>
             </a:lvl4pPr>
-            <a:lvl5pPr marL="1637232" indent="0" algn="ctr">
+            <a:lvl5pPr marL="1598547" indent="0" algn="ctr">
               <a:buNone/>
               <a:defRPr>
                 <a:solidFill>
@@ -221,7 +221,7 @@
                 </a:solidFill>
               </a:defRPr>
             </a:lvl5pPr>
-            <a:lvl6pPr marL="2046541" indent="0" algn="ctr">
+            <a:lvl6pPr marL="1998185" indent="0" algn="ctr">
               <a:buNone/>
               <a:defRPr>
                 <a:solidFill>
@@ -231,7 +231,7 @@
                 </a:solidFill>
               </a:defRPr>
             </a:lvl6pPr>
-            <a:lvl7pPr marL="2455849" indent="0" algn="ctr">
+            <a:lvl7pPr marL="2397823" indent="0" algn="ctr">
               <a:buNone/>
               <a:defRPr>
                 <a:solidFill>
@@ -241,7 +241,7 @@
                 </a:solidFill>
               </a:defRPr>
             </a:lvl7pPr>
-            <a:lvl8pPr marL="2865158" indent="0" algn="ctr">
+            <a:lvl8pPr marL="2797462" indent="0" algn="ctr">
               <a:buNone/>
               <a:defRPr>
                 <a:solidFill>
@@ -251,7 +251,7 @@
                 </a:solidFill>
               </a:defRPr>
             </a:lvl8pPr>
-            <a:lvl9pPr marL="3274465" indent="0" algn="ctr">
+            <a:lvl9pPr marL="3197096" indent="0" algn="ctr">
               <a:buNone/>
               <a:defRPr>
                 <a:solidFill>
@@ -289,7 +289,7 @@
             <a:fld id="{C69E31BE-431C-4F96-86FE-0099C953F73C}" type="datetimeFigureOut">
               <a:rPr lang="en-US" smtClean="0"/>
               <a:pPr/>
-              <a:t>4/1/2015</a:t>
+              <a:t>4/2/2015</a:t>
             </a:fld>
             <a:endParaRPr lang="en-US"/>
           </a:p>
@@ -341,7 +341,7 @@
     </p:spTree>
     <p:extLst>
       <p:ext uri="{BB962C8B-B14F-4D97-AF65-F5344CB8AC3E}">
-        <p14:creationId xmlns:p14="http://schemas.microsoft.com/office/powerpoint/2010/main" xmlns="" val="2187467626"/>
+        <p14:creationId xmlns="" xmlns:p14="http://schemas.microsoft.com/office/powerpoint/2010/main" val="2187467626"/>
       </p:ext>
     </p:extLst>
   </p:cSld>
@@ -461,7 +461,7 @@
             <a:fld id="{C69E31BE-431C-4F96-86FE-0099C953F73C}" type="datetimeFigureOut">
               <a:rPr lang="en-US" smtClean="0"/>
               <a:pPr/>
-              <a:t>4/1/2015</a:t>
+              <a:t>4/2/2015</a:t>
             </a:fld>
             <a:endParaRPr lang="en-US"/>
           </a:p>
@@ -513,7 +513,7 @@
     </p:spTree>
     <p:extLst>
       <p:ext uri="{BB962C8B-B14F-4D97-AF65-F5344CB8AC3E}">
-        <p14:creationId xmlns:p14="http://schemas.microsoft.com/office/powerpoint/2010/main" xmlns="" val="790259655"/>
+        <p14:creationId xmlns="" xmlns:p14="http://schemas.microsoft.com/office/powerpoint/2010/main" val="790259655"/>
       </p:ext>
     </p:extLst>
   </p:cSld>
@@ -552,8 +552,8 @@
         </p:nvSpPr>
         <p:spPr>
           <a:xfrm>
-            <a:off x="3622007" y="659593"/>
-            <a:ext cx="1124071" cy="14049436"/>
+            <a:off x="3523603" y="646061"/>
+            <a:ext cx="1093532" cy="13761217"/>
           </a:xfrm>
         </p:spPr>
         <p:txBody>
@@ -580,8 +580,8 @@
         </p:nvSpPr>
         <p:spPr>
           <a:xfrm>
-            <a:off x="249802" y="659593"/>
-            <a:ext cx="3261188" cy="14049436"/>
+            <a:off x="243016" y="646061"/>
+            <a:ext cx="3172586" cy="13761217"/>
           </a:xfrm>
         </p:spPr>
         <p:txBody>
@@ -643,7 +643,7 @@
             <a:fld id="{C69E31BE-431C-4F96-86FE-0099C953F73C}" type="datetimeFigureOut">
               <a:rPr lang="en-US" smtClean="0"/>
               <a:pPr/>
-              <a:t>4/1/2015</a:t>
+              <a:t>4/2/2015</a:t>
             </a:fld>
             <a:endParaRPr lang="en-US"/>
           </a:p>
@@ -695,7 +695,7 @@
     </p:spTree>
     <p:extLst>
       <p:ext uri="{BB962C8B-B14F-4D97-AF65-F5344CB8AC3E}">
-        <p14:creationId xmlns:p14="http://schemas.microsoft.com/office/powerpoint/2010/main" xmlns="" val="502563980"/>
+        <p14:creationId xmlns="" xmlns:p14="http://schemas.microsoft.com/office/powerpoint/2010/main" val="502563980"/>
       </p:ext>
     </p:extLst>
   </p:cSld>
@@ -815,7 +815,7 @@
             <a:fld id="{C69E31BE-431C-4F96-86FE-0099C953F73C}" type="datetimeFigureOut">
               <a:rPr lang="en-US" smtClean="0"/>
               <a:pPr/>
-              <a:t>4/1/2015</a:t>
+              <a:t>4/2/2015</a:t>
             </a:fld>
             <a:endParaRPr lang="en-US"/>
           </a:p>
@@ -867,7 +867,7 @@
     </p:spTree>
     <p:extLst>
       <p:ext uri="{BB962C8B-B14F-4D97-AF65-F5344CB8AC3E}">
-        <p14:creationId xmlns:p14="http://schemas.microsoft.com/office/powerpoint/2010/main" xmlns="" val="4133789058"/>
+        <p14:creationId xmlns="" xmlns:p14="http://schemas.microsoft.com/office/powerpoint/2010/main" val="4133789058"/>
       </p:ext>
     </p:extLst>
   </p:cSld>
@@ -906,15 +906,15 @@
         </p:nvSpPr>
         <p:spPr>
           <a:xfrm>
-            <a:off x="526186" y="5668785"/>
-            <a:ext cx="5661977" cy="1752095"/>
+            <a:off x="511892" y="5552493"/>
+            <a:ext cx="5508150" cy="1716151"/>
           </a:xfrm>
         </p:spPr>
         <p:txBody>
           <a:bodyPr anchor="t"/>
           <a:lstStyle>
             <a:lvl1pPr algn="l">
-              <a:defRPr sz="3700" b="1" cap="all"/>
+              <a:defRPr sz="3600" b="1" cap="all"/>
             </a:lvl1pPr>
           </a:lstStyle>
           <a:p>
@@ -938,8 +938,8 @@
         </p:nvSpPr>
         <p:spPr>
           <a:xfrm>
-            <a:off x="526186" y="3739035"/>
-            <a:ext cx="5661977" cy="1929754"/>
+            <a:off x="511892" y="3662332"/>
+            <a:ext cx="5508150" cy="1890165"/>
           </a:xfrm>
         </p:spPr>
         <p:txBody>
@@ -947,7 +947,7 @@
           <a:lstStyle>
             <a:lvl1pPr marL="0" indent="0">
               <a:buNone/>
-              <a:defRPr sz="1800">
+              <a:defRPr sz="1700">
                 <a:solidFill>
                   <a:schemeClr val="tx1">
                     <a:tint val="75000"/>
@@ -955,7 +955,7 @@
                 </a:solidFill>
               </a:defRPr>
             </a:lvl1pPr>
-            <a:lvl2pPr marL="409308" indent="0">
+            <a:lvl2pPr marL="399637" indent="0">
               <a:buNone/>
               <a:defRPr sz="1600">
                 <a:solidFill>
@@ -965,9 +965,9 @@
                 </a:solidFill>
               </a:defRPr>
             </a:lvl2pPr>
-            <a:lvl3pPr marL="818617" indent="0">
-              <a:buNone/>
-              <a:defRPr sz="1300">
+            <a:lvl3pPr marL="799276" indent="0">
+              <a:buNone/>
+              <a:defRPr sz="1200">
                 <a:solidFill>
                   <a:schemeClr val="tx1">
                     <a:tint val="75000"/>
@@ -975,7 +975,7 @@
                 </a:solidFill>
               </a:defRPr>
             </a:lvl3pPr>
-            <a:lvl4pPr marL="1227924" indent="0">
+            <a:lvl4pPr marL="1198911" indent="0">
               <a:buNone/>
               <a:defRPr sz="1200">
                 <a:solidFill>
@@ -985,7 +985,7 @@
                 </a:solidFill>
               </a:defRPr>
             </a:lvl4pPr>
-            <a:lvl5pPr marL="1637232" indent="0">
+            <a:lvl5pPr marL="1598547" indent="0">
               <a:buNone/>
               <a:defRPr sz="1200">
                 <a:solidFill>
@@ -995,7 +995,7 @@
                 </a:solidFill>
               </a:defRPr>
             </a:lvl5pPr>
-            <a:lvl6pPr marL="2046541" indent="0">
+            <a:lvl6pPr marL="1998185" indent="0">
               <a:buNone/>
               <a:defRPr sz="1200">
                 <a:solidFill>
@@ -1005,7 +1005,7 @@
                 </a:solidFill>
               </a:defRPr>
             </a:lvl6pPr>
-            <a:lvl7pPr marL="2455849" indent="0">
+            <a:lvl7pPr marL="2397823" indent="0">
               <a:buNone/>
               <a:defRPr sz="1200">
                 <a:solidFill>
@@ -1015,7 +1015,7 @@
                 </a:solidFill>
               </a:defRPr>
             </a:lvl7pPr>
-            <a:lvl8pPr marL="2865158" indent="0">
+            <a:lvl8pPr marL="2797462" indent="0">
               <a:buNone/>
               <a:defRPr sz="1200">
                 <a:solidFill>
@@ -1025,7 +1025,7 @@
                 </a:solidFill>
               </a:defRPr>
             </a:lvl8pPr>
-            <a:lvl9pPr marL="3274465" indent="0">
+            <a:lvl9pPr marL="3197096" indent="0">
               <a:buNone/>
               <a:defRPr sz="1200">
                 <a:solidFill>
@@ -1063,7 +1063,7 @@
             <a:fld id="{C69E31BE-431C-4F96-86FE-0099C953F73C}" type="datetimeFigureOut">
               <a:rPr lang="en-US" smtClean="0"/>
               <a:pPr/>
-              <a:t>4/1/2015</a:t>
+              <a:t>4/2/2015</a:t>
             </a:fld>
             <a:endParaRPr lang="en-US"/>
           </a:p>
@@ -1115,7 +1115,7 @@
     </p:spTree>
     <p:extLst>
       <p:ext uri="{BB962C8B-B14F-4D97-AF65-F5344CB8AC3E}">
-        <p14:creationId xmlns:p14="http://schemas.microsoft.com/office/powerpoint/2010/main" xmlns="" val="458461516"/>
+        <p14:creationId xmlns="" xmlns:p14="http://schemas.microsoft.com/office/powerpoint/2010/main" val="458461516"/>
       </p:ext>
     </p:extLst>
   </p:cSld>
@@ -1177,8 +1177,8 @@
         </p:nvSpPr>
         <p:spPr>
           <a:xfrm>
-            <a:off x="333058" y="2058408"/>
-            <a:ext cx="2942009" cy="5821940"/>
+            <a:off x="324012" y="2016180"/>
+            <a:ext cx="2862078" cy="5702504"/>
           </a:xfrm>
         </p:spPr>
         <p:txBody>
@@ -1188,10 +1188,10 @@
               <a:defRPr sz="2400"/>
             </a:lvl1pPr>
             <a:lvl2pPr>
-              <a:defRPr sz="2200"/>
+              <a:defRPr sz="2100"/>
             </a:lvl2pPr>
             <a:lvl3pPr>
-              <a:defRPr sz="1800"/>
+              <a:defRPr sz="1700"/>
             </a:lvl3pPr>
             <a:lvl4pPr>
               <a:defRPr sz="1600"/>
@@ -1262,8 +1262,8 @@
         </p:nvSpPr>
         <p:spPr>
           <a:xfrm>
-            <a:off x="3386083" y="2058408"/>
-            <a:ext cx="2942009" cy="5821940"/>
+            <a:off x="3294089" y="2016180"/>
+            <a:ext cx="2862078" cy="5702504"/>
           </a:xfrm>
         </p:spPr>
         <p:txBody>
@@ -1273,10 +1273,10 @@
               <a:defRPr sz="2400"/>
             </a:lvl1pPr>
             <a:lvl2pPr>
-              <a:defRPr sz="2200"/>
+              <a:defRPr sz="2100"/>
             </a:lvl2pPr>
             <a:lvl3pPr>
-              <a:defRPr sz="1800"/>
+              <a:defRPr sz="1700"/>
             </a:lvl3pPr>
             <a:lvl4pPr>
               <a:defRPr sz="1600"/>
@@ -1353,7 +1353,7 @@
             <a:fld id="{C69E31BE-431C-4F96-86FE-0099C953F73C}" type="datetimeFigureOut">
               <a:rPr lang="en-US" smtClean="0"/>
               <a:pPr/>
-              <a:t>4/1/2015</a:t>
+              <a:t>4/2/2015</a:t>
             </a:fld>
             <a:endParaRPr lang="en-US"/>
           </a:p>
@@ -1405,7 +1405,7 @@
     </p:spTree>
     <p:extLst>
       <p:ext uri="{BB962C8B-B14F-4D97-AF65-F5344CB8AC3E}">
-        <p14:creationId xmlns:p14="http://schemas.microsoft.com/office/powerpoint/2010/main" xmlns="" val="797418400"/>
+        <p14:creationId xmlns="" xmlns:p14="http://schemas.microsoft.com/office/powerpoint/2010/main" val="797418400"/>
       </p:ext>
     </p:extLst>
   </p:cSld>
@@ -1471,8 +1471,8 @@
         </p:nvSpPr>
         <p:spPr>
           <a:xfrm>
-            <a:off x="333063" y="1974681"/>
-            <a:ext cx="2943164" cy="822954"/>
+            <a:off x="324015" y="1934171"/>
+            <a:ext cx="2863202" cy="806072"/>
           </a:xfrm>
         </p:spPr>
         <p:txBody>
@@ -1480,39 +1480,39 @@
           <a:lstStyle>
             <a:lvl1pPr marL="0" indent="0">
               <a:buNone/>
-              <a:defRPr sz="2200" b="1"/>
+              <a:defRPr sz="2100" b="1"/>
             </a:lvl1pPr>
-            <a:lvl2pPr marL="409308" indent="0">
-              <a:buNone/>
-              <a:defRPr sz="1800" b="1"/>
+            <a:lvl2pPr marL="399637" indent="0">
+              <a:buNone/>
+              <a:defRPr sz="1700" b="1"/>
             </a:lvl2pPr>
-            <a:lvl3pPr marL="818617" indent="0">
+            <a:lvl3pPr marL="799276" indent="0">
               <a:buNone/>
               <a:defRPr sz="1600" b="1"/>
             </a:lvl3pPr>
-            <a:lvl4pPr marL="1227924" indent="0">
-              <a:buNone/>
-              <a:defRPr sz="1300" b="1"/>
+            <a:lvl4pPr marL="1198911" indent="0">
+              <a:buNone/>
+              <a:defRPr sz="1200" b="1"/>
             </a:lvl4pPr>
-            <a:lvl5pPr marL="1637232" indent="0">
-              <a:buNone/>
-              <a:defRPr sz="1300" b="1"/>
+            <a:lvl5pPr marL="1598547" indent="0">
+              <a:buNone/>
+              <a:defRPr sz="1200" b="1"/>
             </a:lvl5pPr>
-            <a:lvl6pPr marL="2046541" indent="0">
-              <a:buNone/>
-              <a:defRPr sz="1300" b="1"/>
+            <a:lvl6pPr marL="1998185" indent="0">
+              <a:buNone/>
+              <a:defRPr sz="1200" b="1"/>
             </a:lvl6pPr>
-            <a:lvl7pPr marL="2455849" indent="0">
-              <a:buNone/>
-              <a:defRPr sz="1300" b="1"/>
+            <a:lvl7pPr marL="2397823" indent="0">
+              <a:buNone/>
+              <a:defRPr sz="1200" b="1"/>
             </a:lvl7pPr>
-            <a:lvl8pPr marL="2865158" indent="0">
-              <a:buNone/>
-              <a:defRPr sz="1300" b="1"/>
+            <a:lvl8pPr marL="2797462" indent="0">
+              <a:buNone/>
+              <a:defRPr sz="1200" b="1"/>
             </a:lvl8pPr>
-            <a:lvl9pPr marL="3274465" indent="0">
-              <a:buNone/>
-              <a:defRPr sz="1300" b="1"/>
+            <a:lvl9pPr marL="3197096" indent="0">
+              <a:buNone/>
+              <a:defRPr sz="1200" b="1"/>
             </a:lvl9pPr>
           </a:lstStyle>
           <a:p>
@@ -1536,39 +1536,39 @@
         </p:nvSpPr>
         <p:spPr>
           <a:xfrm>
-            <a:off x="333063" y="2797636"/>
-            <a:ext cx="2943164" cy="5082711"/>
+            <a:off x="324015" y="2740243"/>
+            <a:ext cx="2863202" cy="4978441"/>
           </a:xfrm>
         </p:spPr>
         <p:txBody>
           <a:bodyPr/>
           <a:lstStyle>
             <a:lvl1pPr>
-              <a:defRPr sz="2200"/>
+              <a:defRPr sz="2100"/>
             </a:lvl1pPr>
             <a:lvl2pPr>
-              <a:defRPr sz="1800"/>
+              <a:defRPr sz="1700"/>
             </a:lvl2pPr>
             <a:lvl3pPr>
               <a:defRPr sz="1600"/>
             </a:lvl3pPr>
             <a:lvl4pPr>
-              <a:defRPr sz="1300"/>
+              <a:defRPr sz="1200"/>
             </a:lvl4pPr>
             <a:lvl5pPr>
-              <a:defRPr sz="1300"/>
+              <a:defRPr sz="1200"/>
             </a:lvl5pPr>
             <a:lvl6pPr>
-              <a:defRPr sz="1300"/>
+              <a:defRPr sz="1200"/>
             </a:lvl6pPr>
             <a:lvl7pPr>
-              <a:defRPr sz="1300"/>
+              <a:defRPr sz="1200"/>
             </a:lvl7pPr>
             <a:lvl8pPr>
-              <a:defRPr sz="1300"/>
+              <a:defRPr sz="1200"/>
             </a:lvl8pPr>
             <a:lvl9pPr>
-              <a:defRPr sz="1300"/>
+              <a:defRPr sz="1200"/>
             </a:lvl9pPr>
           </a:lstStyle>
           <a:p>
@@ -1621,8 +1621,8 @@
         </p:nvSpPr>
         <p:spPr>
           <a:xfrm>
-            <a:off x="3383777" y="1974681"/>
-            <a:ext cx="2944321" cy="822954"/>
+            <a:off x="3291846" y="1934171"/>
+            <a:ext cx="2864328" cy="806072"/>
           </a:xfrm>
         </p:spPr>
         <p:txBody>
@@ -1630,39 +1630,39 @@
           <a:lstStyle>
             <a:lvl1pPr marL="0" indent="0">
               <a:buNone/>
-              <a:defRPr sz="2200" b="1"/>
+              <a:defRPr sz="2100" b="1"/>
             </a:lvl1pPr>
-            <a:lvl2pPr marL="409308" indent="0">
-              <a:buNone/>
-              <a:defRPr sz="1800" b="1"/>
+            <a:lvl2pPr marL="399637" indent="0">
+              <a:buNone/>
+              <a:defRPr sz="1700" b="1"/>
             </a:lvl2pPr>
-            <a:lvl3pPr marL="818617" indent="0">
+            <a:lvl3pPr marL="799276" indent="0">
               <a:buNone/>
               <a:defRPr sz="1600" b="1"/>
             </a:lvl3pPr>
-            <a:lvl4pPr marL="1227924" indent="0">
-              <a:buNone/>
-              <a:defRPr sz="1300" b="1"/>
+            <a:lvl4pPr marL="1198911" indent="0">
+              <a:buNone/>
+              <a:defRPr sz="1200" b="1"/>
             </a:lvl4pPr>
-            <a:lvl5pPr marL="1637232" indent="0">
-              <a:buNone/>
-              <a:defRPr sz="1300" b="1"/>
+            <a:lvl5pPr marL="1598547" indent="0">
+              <a:buNone/>
+              <a:defRPr sz="1200" b="1"/>
             </a:lvl5pPr>
-            <a:lvl6pPr marL="2046541" indent="0">
-              <a:buNone/>
-              <a:defRPr sz="1300" b="1"/>
+            <a:lvl6pPr marL="1998185" indent="0">
+              <a:buNone/>
+              <a:defRPr sz="1200" b="1"/>
             </a:lvl6pPr>
-            <a:lvl7pPr marL="2455849" indent="0">
-              <a:buNone/>
-              <a:defRPr sz="1300" b="1"/>
+            <a:lvl7pPr marL="2397823" indent="0">
+              <a:buNone/>
+              <a:defRPr sz="1200" b="1"/>
             </a:lvl7pPr>
-            <a:lvl8pPr marL="2865158" indent="0">
-              <a:buNone/>
-              <a:defRPr sz="1300" b="1"/>
+            <a:lvl8pPr marL="2797462" indent="0">
+              <a:buNone/>
+              <a:defRPr sz="1200" b="1"/>
             </a:lvl8pPr>
-            <a:lvl9pPr marL="3274465" indent="0">
-              <a:buNone/>
-              <a:defRPr sz="1300" b="1"/>
+            <a:lvl9pPr marL="3197096" indent="0">
+              <a:buNone/>
+              <a:defRPr sz="1200" b="1"/>
             </a:lvl9pPr>
           </a:lstStyle>
           <a:p>
@@ -1686,39 +1686,39 @@
         </p:nvSpPr>
         <p:spPr>
           <a:xfrm>
-            <a:off x="3383777" y="2797636"/>
-            <a:ext cx="2944321" cy="5082711"/>
+            <a:off x="3291846" y="2740243"/>
+            <a:ext cx="2864328" cy="4978441"/>
           </a:xfrm>
         </p:spPr>
         <p:txBody>
           <a:bodyPr/>
           <a:lstStyle>
             <a:lvl1pPr>
-              <a:defRPr sz="2200"/>
+              <a:defRPr sz="2100"/>
             </a:lvl1pPr>
             <a:lvl2pPr>
-              <a:defRPr sz="1800"/>
+              <a:defRPr sz="1700"/>
             </a:lvl2pPr>
             <a:lvl3pPr>
               <a:defRPr sz="1600"/>
             </a:lvl3pPr>
             <a:lvl4pPr>
-              <a:defRPr sz="1300"/>
+              <a:defRPr sz="1200"/>
             </a:lvl4pPr>
             <a:lvl5pPr>
-              <a:defRPr sz="1300"/>
+              <a:defRPr sz="1200"/>
             </a:lvl5pPr>
             <a:lvl6pPr>
-              <a:defRPr sz="1300"/>
+              <a:defRPr sz="1200"/>
             </a:lvl6pPr>
             <a:lvl7pPr>
-              <a:defRPr sz="1300"/>
+              <a:defRPr sz="1200"/>
             </a:lvl7pPr>
             <a:lvl8pPr>
-              <a:defRPr sz="1300"/>
+              <a:defRPr sz="1200"/>
             </a:lvl8pPr>
             <a:lvl9pPr>
-              <a:defRPr sz="1300"/>
+              <a:defRPr sz="1200"/>
             </a:lvl9pPr>
           </a:lstStyle>
           <a:p>
@@ -1777,7 +1777,7 @@
             <a:fld id="{C69E31BE-431C-4F96-86FE-0099C953F73C}" type="datetimeFigureOut">
               <a:rPr lang="en-US" smtClean="0"/>
               <a:pPr/>
-              <a:t>4/1/2015</a:t>
+              <a:t>4/2/2015</a:t>
             </a:fld>
             <a:endParaRPr lang="en-US"/>
           </a:p>
@@ -1829,7 +1829,7 @@
     </p:spTree>
     <p:extLst>
       <p:ext uri="{BB962C8B-B14F-4D97-AF65-F5344CB8AC3E}">
-        <p14:creationId xmlns:p14="http://schemas.microsoft.com/office/powerpoint/2010/main" xmlns="" val="202499912"/>
+        <p14:creationId xmlns="" xmlns:p14="http://schemas.microsoft.com/office/powerpoint/2010/main" val="202499912"/>
       </p:ext>
     </p:extLst>
   </p:cSld>
@@ -1897,7 +1897,7 @@
             <a:fld id="{C69E31BE-431C-4F96-86FE-0099C953F73C}" type="datetimeFigureOut">
               <a:rPr lang="en-US" smtClean="0"/>
               <a:pPr/>
-              <a:t>4/1/2015</a:t>
+              <a:t>4/2/2015</a:t>
             </a:fld>
             <a:endParaRPr lang="en-US"/>
           </a:p>
@@ -1949,7 +1949,7 @@
     </p:spTree>
     <p:extLst>
       <p:ext uri="{BB962C8B-B14F-4D97-AF65-F5344CB8AC3E}">
-        <p14:creationId xmlns:p14="http://schemas.microsoft.com/office/powerpoint/2010/main" xmlns="" val="1124304537"/>
+        <p14:creationId xmlns="" xmlns:p14="http://schemas.microsoft.com/office/powerpoint/2010/main" val="1124304537"/>
       </p:ext>
     </p:extLst>
   </p:cSld>
@@ -1994,7 +1994,7 @@
             <a:fld id="{C69E31BE-431C-4F96-86FE-0099C953F73C}" type="datetimeFigureOut">
               <a:rPr lang="en-US" smtClean="0"/>
               <a:pPr/>
-              <a:t>4/1/2015</a:t>
+              <a:t>4/2/2015</a:t>
             </a:fld>
             <a:endParaRPr lang="en-US"/>
           </a:p>
@@ -2046,7 +2046,7 @@
     </p:spTree>
     <p:extLst>
       <p:ext uri="{BB962C8B-B14F-4D97-AF65-F5344CB8AC3E}">
-        <p14:creationId xmlns:p14="http://schemas.microsoft.com/office/powerpoint/2010/main" xmlns="" val="4086690259"/>
+        <p14:creationId xmlns="" xmlns:p14="http://schemas.microsoft.com/office/powerpoint/2010/main" val="4086690259"/>
       </p:ext>
     </p:extLst>
   </p:cSld>
@@ -2085,15 +2085,15 @@
         </p:nvSpPr>
         <p:spPr>
           <a:xfrm>
-            <a:off x="333067" y="351237"/>
-            <a:ext cx="2191473" cy="1494794"/>
+            <a:off x="324020" y="344032"/>
+            <a:ext cx="2131933" cy="1464130"/>
           </a:xfrm>
         </p:spPr>
         <p:txBody>
           <a:bodyPr anchor="b"/>
           <a:lstStyle>
             <a:lvl1pPr algn="l">
-              <a:defRPr sz="1800" b="1"/>
+              <a:defRPr sz="1700" b="1"/>
             </a:lvl1pPr>
           </a:lstStyle>
           <a:p>
@@ -2117,39 +2117,39 @@
         </p:nvSpPr>
         <p:spPr>
           <a:xfrm>
-            <a:off x="2604334" y="351243"/>
-            <a:ext cx="3723769" cy="7529109"/>
+            <a:off x="2533579" y="344040"/>
+            <a:ext cx="3622599" cy="7374652"/>
           </a:xfrm>
         </p:spPr>
         <p:txBody>
           <a:bodyPr/>
           <a:lstStyle>
             <a:lvl1pPr>
-              <a:defRPr sz="2900"/>
+              <a:defRPr sz="2800"/>
             </a:lvl1pPr>
             <a:lvl2pPr>
               <a:defRPr sz="2400"/>
             </a:lvl2pPr>
             <a:lvl3pPr>
-              <a:defRPr sz="2200"/>
+              <a:defRPr sz="2100"/>
             </a:lvl3pPr>
             <a:lvl4pPr>
-              <a:defRPr sz="1800"/>
+              <a:defRPr sz="1700"/>
             </a:lvl4pPr>
             <a:lvl5pPr>
-              <a:defRPr sz="1800"/>
+              <a:defRPr sz="1700"/>
             </a:lvl5pPr>
             <a:lvl6pPr>
-              <a:defRPr sz="1800"/>
+              <a:defRPr sz="1700"/>
             </a:lvl6pPr>
             <a:lvl7pPr>
-              <a:defRPr sz="1800"/>
+              <a:defRPr sz="1700"/>
             </a:lvl7pPr>
             <a:lvl8pPr>
-              <a:defRPr sz="1800"/>
+              <a:defRPr sz="1700"/>
             </a:lvl8pPr>
             <a:lvl9pPr>
-              <a:defRPr sz="1800"/>
+              <a:defRPr sz="1700"/>
             </a:lvl9pPr>
           </a:lstStyle>
           <a:p>
@@ -2202,8 +2202,8 @@
         </p:nvSpPr>
         <p:spPr>
           <a:xfrm>
-            <a:off x="333067" y="1846039"/>
-            <a:ext cx="2191473" cy="6034315"/>
+            <a:off x="324020" y="1808170"/>
+            <a:ext cx="2131933" cy="5910522"/>
           </a:xfrm>
         </p:spPr>
         <p:txBody>
@@ -2213,35 +2213,35 @@
               <a:buNone/>
               <a:defRPr sz="1200"/>
             </a:lvl1pPr>
-            <a:lvl2pPr marL="409308" indent="0">
-              <a:buNone/>
-              <a:defRPr sz="1000"/>
+            <a:lvl2pPr marL="399637" indent="0">
+              <a:buNone/>
+              <a:defRPr sz="900"/>
             </a:lvl2pPr>
-            <a:lvl3pPr marL="818617" indent="0">
+            <a:lvl3pPr marL="799276" indent="0">
               <a:buNone/>
               <a:defRPr sz="800"/>
             </a:lvl3pPr>
-            <a:lvl4pPr marL="1227924" indent="0">
+            <a:lvl4pPr marL="1198911" indent="0">
               <a:buNone/>
               <a:defRPr sz="800"/>
             </a:lvl4pPr>
-            <a:lvl5pPr marL="1637232" indent="0">
+            <a:lvl5pPr marL="1598547" indent="0">
               <a:buNone/>
               <a:defRPr sz="800"/>
             </a:lvl5pPr>
-            <a:lvl6pPr marL="2046541" indent="0">
+            <a:lvl6pPr marL="1998185" indent="0">
               <a:buNone/>
               <a:defRPr sz="800"/>
             </a:lvl6pPr>
-            <a:lvl7pPr marL="2455849" indent="0">
+            <a:lvl7pPr marL="2397823" indent="0">
               <a:buNone/>
               <a:defRPr sz="800"/>
             </a:lvl7pPr>
-            <a:lvl8pPr marL="2865158" indent="0">
+            <a:lvl8pPr marL="2797462" indent="0">
               <a:buNone/>
               <a:defRPr sz="800"/>
             </a:lvl8pPr>
-            <a:lvl9pPr marL="3274465" indent="0">
+            <a:lvl9pPr marL="3197096" indent="0">
               <a:buNone/>
               <a:defRPr sz="800"/>
             </a:lvl9pPr>
@@ -2273,7 +2273,7 @@
             <a:fld id="{C69E31BE-431C-4F96-86FE-0099C953F73C}" type="datetimeFigureOut">
               <a:rPr lang="en-US" smtClean="0"/>
               <a:pPr/>
-              <a:t>4/1/2015</a:t>
+              <a:t>4/2/2015</a:t>
             </a:fld>
             <a:endParaRPr lang="en-US"/>
           </a:p>
@@ -2325,7 +2325,7 @@
     </p:spTree>
     <p:extLst>
       <p:ext uri="{BB962C8B-B14F-4D97-AF65-F5344CB8AC3E}">
-        <p14:creationId xmlns:p14="http://schemas.microsoft.com/office/powerpoint/2010/main" xmlns="" val="161573557"/>
+        <p14:creationId xmlns="" xmlns:p14="http://schemas.microsoft.com/office/powerpoint/2010/main" val="161573557"/>
       </p:ext>
     </p:extLst>
   </p:cSld>
@@ -2364,15 +2364,15 @@
         </p:nvSpPr>
         <p:spPr>
           <a:xfrm>
-            <a:off x="1305635" y="6175220"/>
-            <a:ext cx="3996690" cy="729020"/>
+            <a:off x="1270164" y="6048537"/>
+            <a:ext cx="3888105" cy="714065"/>
           </a:xfrm>
         </p:spPr>
         <p:txBody>
           <a:bodyPr anchor="b"/>
           <a:lstStyle>
             <a:lvl1pPr algn="l">
-              <a:defRPr sz="1800" b="1"/>
+              <a:defRPr sz="1700" b="1"/>
             </a:lvl1pPr>
           </a:lstStyle>
           <a:p>
@@ -2396,8 +2396,8 @@
         </p:nvSpPr>
         <p:spPr>
           <a:xfrm>
-            <a:off x="1305635" y="788239"/>
-            <a:ext cx="3996690" cy="5293043"/>
+            <a:off x="1270164" y="772069"/>
+            <a:ext cx="3888105" cy="5184458"/>
           </a:xfrm>
         </p:spPr>
         <p:txBody>
@@ -2405,39 +2405,39 @@
           <a:lstStyle>
             <a:lvl1pPr marL="0" indent="0">
               <a:buNone/>
-              <a:defRPr sz="2900"/>
+              <a:defRPr sz="2800"/>
             </a:lvl1pPr>
-            <a:lvl2pPr marL="409308" indent="0">
+            <a:lvl2pPr marL="399637" indent="0">
               <a:buNone/>
               <a:defRPr sz="2400"/>
             </a:lvl2pPr>
-            <a:lvl3pPr marL="818617" indent="0">
-              <a:buNone/>
-              <a:defRPr sz="2200"/>
+            <a:lvl3pPr marL="799276" indent="0">
+              <a:buNone/>
+              <a:defRPr sz="2100"/>
             </a:lvl3pPr>
-            <a:lvl4pPr marL="1227924" indent="0">
-              <a:buNone/>
-              <a:defRPr sz="1800"/>
+            <a:lvl4pPr marL="1198911" indent="0">
+              <a:buNone/>
+              <a:defRPr sz="1700"/>
             </a:lvl4pPr>
-            <a:lvl5pPr marL="1637232" indent="0">
-              <a:buNone/>
-              <a:defRPr sz="1800"/>
+            <a:lvl5pPr marL="1598547" indent="0">
+              <a:buNone/>
+              <a:defRPr sz="1700"/>
             </a:lvl5pPr>
-            <a:lvl6pPr marL="2046541" indent="0">
-              <a:buNone/>
-              <a:defRPr sz="1800"/>
+            <a:lvl6pPr marL="1998185" indent="0">
+              <a:buNone/>
+              <a:defRPr sz="1700"/>
             </a:lvl6pPr>
-            <a:lvl7pPr marL="2455849" indent="0">
-              <a:buNone/>
-              <a:defRPr sz="1800"/>
+            <a:lvl7pPr marL="2397823" indent="0">
+              <a:buNone/>
+              <a:defRPr sz="1700"/>
             </a:lvl7pPr>
-            <a:lvl8pPr marL="2865158" indent="0">
-              <a:buNone/>
-              <a:defRPr sz="1800"/>
+            <a:lvl8pPr marL="2797462" indent="0">
+              <a:buNone/>
+              <a:defRPr sz="1700"/>
             </a:lvl8pPr>
-            <a:lvl9pPr marL="3274465" indent="0">
-              <a:buNone/>
-              <a:defRPr sz="1800"/>
+            <a:lvl9pPr marL="3197096" indent="0">
+              <a:buNone/>
+              <a:defRPr sz="1700"/>
             </a:lvl9pPr>
           </a:lstStyle>
           <a:p>
@@ -2457,8 +2457,8 @@
         </p:nvSpPr>
         <p:spPr>
           <a:xfrm>
-            <a:off x="1305635" y="6904237"/>
-            <a:ext cx="3996690" cy="1035328"/>
+            <a:off x="1270164" y="6762602"/>
+            <a:ext cx="3888105" cy="1014087"/>
           </a:xfrm>
         </p:spPr>
         <p:txBody>
@@ -2468,35 +2468,35 @@
               <a:buNone/>
               <a:defRPr sz="1200"/>
             </a:lvl1pPr>
-            <a:lvl2pPr marL="409308" indent="0">
-              <a:buNone/>
-              <a:defRPr sz="1000"/>
+            <a:lvl2pPr marL="399637" indent="0">
+              <a:buNone/>
+              <a:defRPr sz="900"/>
             </a:lvl2pPr>
-            <a:lvl3pPr marL="818617" indent="0">
+            <a:lvl3pPr marL="799276" indent="0">
               <a:buNone/>
               <a:defRPr sz="800"/>
             </a:lvl3pPr>
-            <a:lvl4pPr marL="1227924" indent="0">
+            <a:lvl4pPr marL="1198911" indent="0">
               <a:buNone/>
               <a:defRPr sz="800"/>
             </a:lvl4pPr>
-            <a:lvl5pPr marL="1637232" indent="0">
+            <a:lvl5pPr marL="1598547" indent="0">
               <a:buNone/>
               <a:defRPr sz="800"/>
             </a:lvl5pPr>
-            <a:lvl6pPr marL="2046541" indent="0">
+            <a:lvl6pPr marL="1998185" indent="0">
               <a:buNone/>
               <a:defRPr sz="800"/>
             </a:lvl6pPr>
-            <a:lvl7pPr marL="2455849" indent="0">
+            <a:lvl7pPr marL="2397823" indent="0">
               <a:buNone/>
               <a:defRPr sz="800"/>
             </a:lvl7pPr>
-            <a:lvl8pPr marL="2865158" indent="0">
+            <a:lvl8pPr marL="2797462" indent="0">
               <a:buNone/>
               <a:defRPr sz="800"/>
             </a:lvl8pPr>
-            <a:lvl9pPr marL="3274465" indent="0">
+            <a:lvl9pPr marL="3197096" indent="0">
               <a:buNone/>
               <a:defRPr sz="800"/>
             </a:lvl9pPr>
@@ -2528,7 +2528,7 @@
             <a:fld id="{C69E31BE-431C-4F96-86FE-0099C953F73C}" type="datetimeFigureOut">
               <a:rPr lang="en-US" smtClean="0"/>
               <a:pPr/>
-              <a:t>4/1/2015</a:t>
+              <a:t>4/2/2015</a:t>
             </a:fld>
             <a:endParaRPr lang="en-US"/>
           </a:p>
@@ -2580,7 +2580,7 @@
     </p:spTree>
     <p:extLst>
       <p:ext uri="{BB962C8B-B14F-4D97-AF65-F5344CB8AC3E}">
-        <p14:creationId xmlns:p14="http://schemas.microsoft.com/office/powerpoint/2010/main" xmlns="" val="1090656924"/>
+        <p14:creationId xmlns="" xmlns:p14="http://schemas.microsoft.com/office/powerpoint/2010/main" val="1090656924"/>
       </p:ext>
     </p:extLst>
   </p:cSld>
@@ -2624,15 +2624,15 @@
         </p:nvSpPr>
         <p:spPr>
           <a:xfrm>
-            <a:off x="333060" y="353281"/>
-            <a:ext cx="5995034" cy="1470289"/>
+            <a:off x="324011" y="346035"/>
+            <a:ext cx="5832157" cy="1440127"/>
           </a:xfrm>
           <a:prstGeom prst="rect">
             <a:avLst/>
           </a:prstGeom>
         </p:spPr>
         <p:txBody>
-          <a:bodyPr vert="horz" lIns="81862" tIns="40931" rIns="81862" bIns="40931" rtlCol="0" anchor="ctr">
+          <a:bodyPr vert="horz" lIns="79928" tIns="39965" rIns="79928" bIns="39965" rtlCol="0" anchor="ctr">
             <a:normAutofit/>
           </a:bodyPr>
           <a:lstStyle/>
@@ -2657,15 +2657,15 @@
         </p:nvSpPr>
         <p:spPr>
           <a:xfrm>
-            <a:off x="333060" y="2058408"/>
-            <a:ext cx="5995034" cy="5821940"/>
+            <a:off x="324011" y="2016180"/>
+            <a:ext cx="5832157" cy="5702504"/>
           </a:xfrm>
           <a:prstGeom prst="rect">
             <a:avLst/>
           </a:prstGeom>
         </p:spPr>
         <p:txBody>
-          <a:bodyPr vert="horz" lIns="81862" tIns="40931" rIns="81862" bIns="40931" rtlCol="0">
+          <a:bodyPr vert="horz" lIns="79928" tIns="39965" rIns="79928" bIns="39965" rtlCol="0">
             <a:normAutofit/>
           </a:bodyPr>
           <a:lstStyle/>
@@ -2719,18 +2719,18 @@
         </p:nvSpPr>
         <p:spPr>
           <a:xfrm>
-            <a:off x="333059" y="8176449"/>
-            <a:ext cx="1554269" cy="469676"/>
+            <a:off x="324012" y="8008712"/>
+            <a:ext cx="1512042" cy="460042"/>
           </a:xfrm>
           <a:prstGeom prst="rect">
             <a:avLst/>
           </a:prstGeom>
         </p:spPr>
         <p:txBody>
-          <a:bodyPr vert="horz" lIns="81862" tIns="40931" rIns="81862" bIns="40931" rtlCol="0" anchor="ctr"/>
+          <a:bodyPr vert="horz" lIns="79928" tIns="39965" rIns="79928" bIns="39965" rtlCol="0" anchor="ctr"/>
           <a:lstStyle>
             <a:lvl1pPr algn="l">
-              <a:defRPr sz="1000">
+              <a:defRPr sz="900">
                 <a:solidFill>
                   <a:schemeClr val="tx1">
                     <a:tint val="75000"/>
@@ -2743,7 +2743,7 @@
             <a:fld id="{C69E31BE-431C-4F96-86FE-0099C953F73C}" type="datetimeFigureOut">
               <a:rPr lang="en-US" smtClean="0"/>
               <a:pPr/>
-              <a:t>4/1/2015</a:t>
+              <a:t>4/2/2015</a:t>
             </a:fld>
             <a:endParaRPr lang="en-US"/>
           </a:p>
@@ -2761,18 +2761,18 @@
         </p:nvSpPr>
         <p:spPr>
           <a:xfrm>
-            <a:off x="2275895" y="8176449"/>
-            <a:ext cx="2109364" cy="469676"/>
+            <a:off x="2214063" y="8008712"/>
+            <a:ext cx="2052056" cy="460042"/>
           </a:xfrm>
           <a:prstGeom prst="rect">
             <a:avLst/>
           </a:prstGeom>
         </p:spPr>
         <p:txBody>
-          <a:bodyPr vert="horz" lIns="81862" tIns="40931" rIns="81862" bIns="40931" rtlCol="0" anchor="ctr"/>
+          <a:bodyPr vert="horz" lIns="79928" tIns="39965" rIns="79928" bIns="39965" rtlCol="0" anchor="ctr"/>
           <a:lstStyle>
             <a:lvl1pPr algn="ctr">
-              <a:defRPr sz="1000">
+              <a:defRPr sz="900">
                 <a:solidFill>
                   <a:schemeClr val="tx1">
                     <a:tint val="75000"/>
@@ -2798,18 +2798,18 @@
         </p:nvSpPr>
         <p:spPr>
           <a:xfrm>
-            <a:off x="4773825" y="8176449"/>
-            <a:ext cx="1554269" cy="469676"/>
+            <a:off x="4644129" y="8008712"/>
+            <a:ext cx="1512042" cy="460042"/>
           </a:xfrm>
           <a:prstGeom prst="rect">
             <a:avLst/>
           </a:prstGeom>
         </p:spPr>
         <p:txBody>
-          <a:bodyPr vert="horz" lIns="81862" tIns="40931" rIns="81862" bIns="40931" rtlCol="0" anchor="ctr"/>
+          <a:bodyPr vert="horz" lIns="79928" tIns="39965" rIns="79928" bIns="39965" rtlCol="0" anchor="ctr"/>
           <a:lstStyle>
             <a:lvl1pPr algn="r">
-              <a:defRPr sz="1000">
+              <a:defRPr sz="900">
                 <a:solidFill>
                   <a:schemeClr val="tx1">
                     <a:tint val="75000"/>
@@ -2831,7 +2831,7 @@
     </p:spTree>
     <p:extLst>
       <p:ext uri="{BB962C8B-B14F-4D97-AF65-F5344CB8AC3E}">
-        <p14:creationId xmlns:p14="http://schemas.microsoft.com/office/powerpoint/2010/main" xmlns="" val="2194502168"/>
+        <p14:creationId xmlns="" xmlns:p14="http://schemas.microsoft.com/office/powerpoint/2010/main" val="2194502168"/>
       </p:ext>
     </p:extLst>
   </p:cSld>
@@ -2851,12 +2851,12 @@
   </p:sldLayoutIdLst>
   <p:txStyles>
     <p:titleStyle>
-      <a:lvl1pPr algn="ctr" defTabSz="818617" rtl="0" eaLnBrk="1" latinLnBrk="0" hangingPunct="1">
+      <a:lvl1pPr algn="ctr" defTabSz="799276" rtl="0" eaLnBrk="1" latinLnBrk="0" hangingPunct="1">
         <a:spcBef>
           <a:spcPct val="0"/>
         </a:spcBef>
         <a:buNone/>
-        <a:defRPr sz="3900" kern="1200">
+        <a:defRPr sz="3700" kern="1200">
           <a:solidFill>
             <a:schemeClr val="tx1"/>
           </a:solidFill>
@@ -2867,13 +2867,13 @@
       </a:lvl1pPr>
     </p:titleStyle>
     <p:bodyStyle>
-      <a:lvl1pPr marL="306982" indent="-306982" algn="l" defTabSz="818617" rtl="0" eaLnBrk="1" latinLnBrk="0" hangingPunct="1">
+      <a:lvl1pPr marL="299729" indent="-299729" algn="l" defTabSz="799276" rtl="0" eaLnBrk="1" latinLnBrk="0" hangingPunct="1">
         <a:spcBef>
           <a:spcPct val="20000"/>
         </a:spcBef>
         <a:buFont typeface="Arial" pitchFamily="34" charset="0"/>
         <a:buChar char="•"/>
-        <a:defRPr sz="2900" kern="1200">
+        <a:defRPr sz="2800" kern="1200">
           <a:solidFill>
             <a:schemeClr val="tx1"/>
           </a:solidFill>
@@ -2882,7 +2882,7 @@
           <a:cs typeface="+mn-cs"/>
         </a:defRPr>
       </a:lvl1pPr>
-      <a:lvl2pPr marL="665125" indent="-255818" algn="l" defTabSz="818617" rtl="0" eaLnBrk="1" latinLnBrk="0" hangingPunct="1">
+      <a:lvl2pPr marL="649411" indent="-249774" algn="l" defTabSz="799276" rtl="0" eaLnBrk="1" latinLnBrk="0" hangingPunct="1">
         <a:spcBef>
           <a:spcPct val="20000"/>
         </a:spcBef>
@@ -2897,13 +2897,13 @@
           <a:cs typeface="+mn-cs"/>
         </a:defRPr>
       </a:lvl2pPr>
-      <a:lvl3pPr marL="1023269" indent="-204654" algn="l" defTabSz="818617" rtl="0" eaLnBrk="1" latinLnBrk="0" hangingPunct="1">
+      <a:lvl3pPr marL="999091" indent="-199820" algn="l" defTabSz="799276" rtl="0" eaLnBrk="1" latinLnBrk="0" hangingPunct="1">
         <a:spcBef>
           <a:spcPct val="20000"/>
         </a:spcBef>
         <a:buFont typeface="Arial" pitchFamily="34" charset="0"/>
         <a:buChar char="•"/>
-        <a:defRPr sz="2200" kern="1200">
+        <a:defRPr sz="2100" kern="1200">
           <a:solidFill>
             <a:schemeClr val="tx1"/>
           </a:solidFill>
@@ -2912,13 +2912,13 @@
           <a:cs typeface="+mn-cs"/>
         </a:defRPr>
       </a:lvl3pPr>
-      <a:lvl4pPr marL="1432579" indent="-204654" algn="l" defTabSz="818617" rtl="0" eaLnBrk="1" latinLnBrk="0" hangingPunct="1">
+      <a:lvl4pPr marL="1398729" indent="-199820" algn="l" defTabSz="799276" rtl="0" eaLnBrk="1" latinLnBrk="0" hangingPunct="1">
         <a:spcBef>
           <a:spcPct val="20000"/>
         </a:spcBef>
         <a:buFont typeface="Arial" pitchFamily="34" charset="0"/>
         <a:buChar char="–"/>
-        <a:defRPr sz="1800" kern="1200">
+        <a:defRPr sz="1700" kern="1200">
           <a:solidFill>
             <a:schemeClr val="tx1"/>
           </a:solidFill>
@@ -2927,13 +2927,13 @@
           <a:cs typeface="+mn-cs"/>
         </a:defRPr>
       </a:lvl4pPr>
-      <a:lvl5pPr marL="1841887" indent="-204654" algn="l" defTabSz="818617" rtl="0" eaLnBrk="1" latinLnBrk="0" hangingPunct="1">
+      <a:lvl5pPr marL="1798367" indent="-199820" algn="l" defTabSz="799276" rtl="0" eaLnBrk="1" latinLnBrk="0" hangingPunct="1">
         <a:spcBef>
           <a:spcPct val="20000"/>
         </a:spcBef>
         <a:buFont typeface="Arial" pitchFamily="34" charset="0"/>
         <a:buChar char="»"/>
-        <a:defRPr sz="1800" kern="1200">
+        <a:defRPr sz="1700" kern="1200">
           <a:solidFill>
             <a:schemeClr val="tx1"/>
           </a:solidFill>
@@ -2942,13 +2942,13 @@
           <a:cs typeface="+mn-cs"/>
         </a:defRPr>
       </a:lvl5pPr>
-      <a:lvl6pPr marL="2251194" indent="-204654" algn="l" defTabSz="818617" rtl="0" eaLnBrk="1" latinLnBrk="0" hangingPunct="1">
+      <a:lvl6pPr marL="2198003" indent="-199820" algn="l" defTabSz="799276" rtl="0" eaLnBrk="1" latinLnBrk="0" hangingPunct="1">
         <a:spcBef>
           <a:spcPct val="20000"/>
         </a:spcBef>
         <a:buFont typeface="Arial" pitchFamily="34" charset="0"/>
         <a:buChar char="•"/>
-        <a:defRPr sz="1800" kern="1200">
+        <a:defRPr sz="1700" kern="1200">
           <a:solidFill>
             <a:schemeClr val="tx1"/>
           </a:solidFill>
@@ -2957,13 +2957,13 @@
           <a:cs typeface="+mn-cs"/>
         </a:defRPr>
       </a:lvl6pPr>
-      <a:lvl7pPr marL="2660504" indent="-204654" algn="l" defTabSz="818617" rtl="0" eaLnBrk="1" latinLnBrk="0" hangingPunct="1">
+      <a:lvl7pPr marL="2597642" indent="-199820" algn="l" defTabSz="799276" rtl="0" eaLnBrk="1" latinLnBrk="0" hangingPunct="1">
         <a:spcBef>
           <a:spcPct val="20000"/>
         </a:spcBef>
         <a:buFont typeface="Arial" pitchFamily="34" charset="0"/>
         <a:buChar char="•"/>
-        <a:defRPr sz="1800" kern="1200">
+        <a:defRPr sz="1700" kern="1200">
           <a:solidFill>
             <a:schemeClr val="tx1"/>
           </a:solidFill>
@@ -2972,13 +2972,13 @@
           <a:cs typeface="+mn-cs"/>
         </a:defRPr>
       </a:lvl7pPr>
-      <a:lvl8pPr marL="3069811" indent="-204654" algn="l" defTabSz="818617" rtl="0" eaLnBrk="1" latinLnBrk="0" hangingPunct="1">
+      <a:lvl8pPr marL="2997279" indent="-199820" algn="l" defTabSz="799276" rtl="0" eaLnBrk="1" latinLnBrk="0" hangingPunct="1">
         <a:spcBef>
           <a:spcPct val="20000"/>
         </a:spcBef>
         <a:buFont typeface="Arial" pitchFamily="34" charset="0"/>
         <a:buChar char="•"/>
-        <a:defRPr sz="1800" kern="1200">
+        <a:defRPr sz="1700" kern="1200">
           <a:solidFill>
             <a:schemeClr val="tx1"/>
           </a:solidFill>
@@ -2987,13 +2987,13 @@
           <a:cs typeface="+mn-cs"/>
         </a:defRPr>
       </a:lvl8pPr>
-      <a:lvl9pPr marL="3479120" indent="-204654" algn="l" defTabSz="818617" rtl="0" eaLnBrk="1" latinLnBrk="0" hangingPunct="1">
+      <a:lvl9pPr marL="3396915" indent="-199820" algn="l" defTabSz="799276" rtl="0" eaLnBrk="1" latinLnBrk="0" hangingPunct="1">
         <a:spcBef>
           <a:spcPct val="20000"/>
         </a:spcBef>
         <a:buFont typeface="Arial" pitchFamily="34" charset="0"/>
         <a:buChar char="•"/>
-        <a:defRPr sz="1800" kern="1200">
+        <a:defRPr sz="1700" kern="1200">
           <a:solidFill>
             <a:schemeClr val="tx1"/>
           </a:solidFill>
@@ -3007,7 +3007,7 @@
       <a:defPPr>
         <a:defRPr lang="en-US"/>
       </a:defPPr>
-      <a:lvl1pPr marL="0" algn="l" defTabSz="818617" rtl="0" eaLnBrk="1" latinLnBrk="0" hangingPunct="1">
+      <a:lvl1pPr marL="0" algn="l" defTabSz="799276" rtl="0" eaLnBrk="1" latinLnBrk="0" hangingPunct="1">
         <a:defRPr sz="1600" kern="1200">
           <a:solidFill>
             <a:schemeClr val="tx1"/>
@@ -3017,7 +3017,7 @@
           <a:cs typeface="+mn-cs"/>
         </a:defRPr>
       </a:lvl1pPr>
-      <a:lvl2pPr marL="409308" algn="l" defTabSz="818617" rtl="0" eaLnBrk="1" latinLnBrk="0" hangingPunct="1">
+      <a:lvl2pPr marL="399637" algn="l" defTabSz="799276" rtl="0" eaLnBrk="1" latinLnBrk="0" hangingPunct="1">
         <a:defRPr sz="1600" kern="1200">
           <a:solidFill>
             <a:schemeClr val="tx1"/>
@@ -3027,7 +3027,7 @@
           <a:cs typeface="+mn-cs"/>
         </a:defRPr>
       </a:lvl2pPr>
-      <a:lvl3pPr marL="818617" algn="l" defTabSz="818617" rtl="0" eaLnBrk="1" latinLnBrk="0" hangingPunct="1">
+      <a:lvl3pPr marL="799276" algn="l" defTabSz="799276" rtl="0" eaLnBrk="1" latinLnBrk="0" hangingPunct="1">
         <a:defRPr sz="1600" kern="1200">
           <a:solidFill>
             <a:schemeClr val="tx1"/>
@@ -3037,7 +3037,7 @@
           <a:cs typeface="+mn-cs"/>
         </a:defRPr>
       </a:lvl3pPr>
-      <a:lvl4pPr marL="1227924" algn="l" defTabSz="818617" rtl="0" eaLnBrk="1" latinLnBrk="0" hangingPunct="1">
+      <a:lvl4pPr marL="1198911" algn="l" defTabSz="799276" rtl="0" eaLnBrk="1" latinLnBrk="0" hangingPunct="1">
         <a:defRPr sz="1600" kern="1200">
           <a:solidFill>
             <a:schemeClr val="tx1"/>
@@ -3047,7 +3047,7 @@
           <a:cs typeface="+mn-cs"/>
         </a:defRPr>
       </a:lvl4pPr>
-      <a:lvl5pPr marL="1637232" algn="l" defTabSz="818617" rtl="0" eaLnBrk="1" latinLnBrk="0" hangingPunct="1">
+      <a:lvl5pPr marL="1598547" algn="l" defTabSz="799276" rtl="0" eaLnBrk="1" latinLnBrk="0" hangingPunct="1">
         <a:defRPr sz="1600" kern="1200">
           <a:solidFill>
             <a:schemeClr val="tx1"/>
@@ -3057,7 +3057,7 @@
           <a:cs typeface="+mn-cs"/>
         </a:defRPr>
       </a:lvl5pPr>
-      <a:lvl6pPr marL="2046541" algn="l" defTabSz="818617" rtl="0" eaLnBrk="1" latinLnBrk="0" hangingPunct="1">
+      <a:lvl6pPr marL="1998185" algn="l" defTabSz="799276" rtl="0" eaLnBrk="1" latinLnBrk="0" hangingPunct="1">
         <a:defRPr sz="1600" kern="1200">
           <a:solidFill>
             <a:schemeClr val="tx1"/>
@@ -3067,7 +3067,7 @@
           <a:cs typeface="+mn-cs"/>
         </a:defRPr>
       </a:lvl6pPr>
-      <a:lvl7pPr marL="2455849" algn="l" defTabSz="818617" rtl="0" eaLnBrk="1" latinLnBrk="0" hangingPunct="1">
+      <a:lvl7pPr marL="2397823" algn="l" defTabSz="799276" rtl="0" eaLnBrk="1" latinLnBrk="0" hangingPunct="1">
         <a:defRPr sz="1600" kern="1200">
           <a:solidFill>
             <a:schemeClr val="tx1"/>
@@ -3077,7 +3077,7 @@
           <a:cs typeface="+mn-cs"/>
         </a:defRPr>
       </a:lvl7pPr>
-      <a:lvl8pPr marL="2865158" algn="l" defTabSz="818617" rtl="0" eaLnBrk="1" latinLnBrk="0" hangingPunct="1">
+      <a:lvl8pPr marL="2797462" algn="l" defTabSz="799276" rtl="0" eaLnBrk="1" latinLnBrk="0" hangingPunct="1">
         <a:defRPr sz="1600" kern="1200">
           <a:solidFill>
             <a:schemeClr val="tx1"/>
@@ -3087,7 +3087,7 @@
           <a:cs typeface="+mn-cs"/>
         </a:defRPr>
       </a:lvl8pPr>
-      <a:lvl9pPr marL="3274465" algn="l" defTabSz="818617" rtl="0" eaLnBrk="1" latinLnBrk="0" hangingPunct="1">
+      <a:lvl9pPr marL="3197096" algn="l" defTabSz="799276" rtl="0" eaLnBrk="1" latinLnBrk="0" hangingPunct="1">
         <a:defRPr sz="1600" kern="1200">
           <a:solidFill>
             <a:schemeClr val="tx1"/>
@@ -3127,8 +3127,8 @@
         </p:nvSpPr>
         <p:spPr>
           <a:xfrm>
-            <a:off x="891105" y="95697"/>
-            <a:ext cx="1600200" cy="457200"/>
+            <a:off x="866896" y="93737"/>
+            <a:ext cx="1556724" cy="447819"/>
           </a:xfrm>
           <a:prstGeom prst="rect">
             <a:avLst/>
@@ -3150,10 +3150,10 @@
           <a:effectLst/>
         </p:spPr>
         <p:txBody>
-          <a:bodyPr lIns="91434" tIns="45717" rIns="91434" bIns="45717" anchor="ctr"/>
-          <a:lstStyle/>
-          <a:p>
-            <a:pPr algn="ctr" defTabSz="457169" fontAlgn="base">
+          <a:bodyPr lIns="89274" tIns="44638" rIns="89274" bIns="44638" anchor="ctr"/>
+          <a:lstStyle/>
+          <a:p>
+            <a:pPr algn="ctr" defTabSz="446367" fontAlgn="base">
               <a:spcBef>
                 <a:spcPct val="0"/>
               </a:spcBef>
@@ -3196,8 +3196,8 @@
         </p:nvSpPr>
         <p:spPr>
           <a:xfrm>
-            <a:off x="2491305" y="95697"/>
-            <a:ext cx="1600200" cy="457200"/>
+            <a:off x="2423619" y="93737"/>
+            <a:ext cx="1556724" cy="447819"/>
           </a:xfrm>
           <a:prstGeom prst="rect">
             <a:avLst/>
@@ -3217,10 +3217,10 @@
           <a:effectLst/>
         </p:spPr>
         <p:txBody>
-          <a:bodyPr lIns="91434" tIns="45717" rIns="91434" bIns="45717" anchor="ctr"/>
-          <a:lstStyle/>
-          <a:p>
-            <a:pPr algn="ctr" defTabSz="457169" fontAlgn="base">
+          <a:bodyPr lIns="89274" tIns="44638" rIns="89274" bIns="44638" anchor="ctr"/>
+          <a:lstStyle/>
+          <a:p>
+            <a:pPr algn="ctr" defTabSz="446367" fontAlgn="base">
               <a:lnSpc>
                 <a:spcPct val="80000"/>
               </a:lnSpc>
@@ -3253,8 +3253,8 @@
         </p:nvSpPr>
         <p:spPr>
           <a:xfrm>
-            <a:off x="4091505" y="95697"/>
-            <a:ext cx="1600200" cy="457200"/>
+            <a:off x="3980345" y="93737"/>
+            <a:ext cx="1556724" cy="447819"/>
           </a:xfrm>
           <a:prstGeom prst="rect">
             <a:avLst/>
@@ -3274,10 +3274,10 @@
           <a:effectLst/>
         </p:spPr>
         <p:txBody>
-          <a:bodyPr lIns="91434" tIns="45717" rIns="91434" bIns="45717" anchor="ctr"/>
-          <a:lstStyle/>
-          <a:p>
-            <a:pPr algn="ctr" defTabSz="457169" fontAlgn="base">
+          <a:bodyPr lIns="89274" tIns="44638" rIns="89274" bIns="44638" anchor="ctr"/>
+          <a:lstStyle/>
+          <a:p>
+            <a:pPr algn="ctr" defTabSz="446367" fontAlgn="base">
               <a:lnSpc>
                 <a:spcPct val="80000"/>
               </a:lnSpc>
@@ -3310,8 +3310,8 @@
         </p:nvSpPr>
         <p:spPr>
           <a:xfrm>
-            <a:off x="891105" y="95697"/>
-            <a:ext cx="1600200" cy="8643144"/>
+            <a:off x="866896" y="93732"/>
+            <a:ext cx="1556724" cy="8465834"/>
           </a:xfrm>
           <a:prstGeom prst="rect">
             <a:avLst/>
@@ -3339,11 +3339,11 @@
           </a:fontRef>
         </p:style>
         <p:txBody>
-          <a:bodyPr lIns="91434" tIns="45717" rIns="91434" bIns="45717" rtlCol="0" anchor="ctr"/>
+          <a:bodyPr lIns="89274" tIns="44638" rIns="89274" bIns="44638" rtlCol="0" anchor="ctr"/>
           <a:lstStyle/>
           <a:p>
             <a:pPr algn="ctr"/>
-            <a:endParaRPr lang="en-US" sz="1600"/>
+            <a:endParaRPr lang="en-US" dirty="0"/>
           </a:p>
         </p:txBody>
       </p:sp>
@@ -3355,8 +3355,8 @@
         </p:nvSpPr>
         <p:spPr>
           <a:xfrm>
-            <a:off x="2491305" y="95697"/>
-            <a:ext cx="1600200" cy="8643144"/>
+            <a:off x="2423619" y="93732"/>
+            <a:ext cx="1556724" cy="8465834"/>
           </a:xfrm>
           <a:prstGeom prst="rect">
             <a:avLst/>
@@ -3384,11 +3384,11 @@
           </a:fontRef>
         </p:style>
         <p:txBody>
-          <a:bodyPr lIns="91434" tIns="45717" rIns="91434" bIns="45717" rtlCol="0" anchor="ctr"/>
+          <a:bodyPr lIns="89274" tIns="44638" rIns="89274" bIns="44638" rtlCol="0" anchor="ctr"/>
           <a:lstStyle/>
           <a:p>
             <a:pPr algn="ctr"/>
-            <a:endParaRPr lang="en-US" sz="1600"/>
+            <a:endParaRPr lang="en-US" dirty="0"/>
           </a:p>
         </p:txBody>
       </p:sp>
@@ -3400,8 +3400,8 @@
         </p:nvSpPr>
         <p:spPr>
           <a:xfrm>
-            <a:off x="4091505" y="95697"/>
-            <a:ext cx="1600200" cy="8643144"/>
+            <a:off x="3980345" y="93732"/>
+            <a:ext cx="1556724" cy="8465834"/>
           </a:xfrm>
           <a:prstGeom prst="rect">
             <a:avLst/>
@@ -3429,11 +3429,11 @@
           </a:fontRef>
         </p:style>
         <p:txBody>
-          <a:bodyPr lIns="91434" tIns="45717" rIns="91434" bIns="45717" rtlCol="0" anchor="ctr"/>
+          <a:bodyPr lIns="89274" tIns="44638" rIns="89274" bIns="44638" rtlCol="0" anchor="ctr"/>
           <a:lstStyle/>
           <a:p>
             <a:pPr algn="ctr"/>
-            <a:endParaRPr lang="en-US" sz="1600"/>
+            <a:endParaRPr lang="en-US" dirty="0"/>
           </a:p>
         </p:txBody>
       </p:sp>
@@ -3445,8 +3445,8 @@
         </p:nvSpPr>
         <p:spPr>
           <a:xfrm>
-            <a:off x="1043505" y="5353497"/>
-            <a:ext cx="1371600" cy="609600"/>
+            <a:off x="1015155" y="5243671"/>
+            <a:ext cx="1334335" cy="597094"/>
           </a:xfrm>
           <a:prstGeom prst="roundRect">
             <a:avLst/>
@@ -3467,10 +3467,10 @@
           <a:effectLst/>
         </p:spPr>
         <p:txBody>
-          <a:bodyPr lIns="91434" tIns="45717" rIns="91434" bIns="45717" anchor="ctr"/>
-          <a:lstStyle/>
-          <a:p>
-            <a:pPr algn="ctr" defTabSz="457169" fontAlgn="base">
+          <a:bodyPr lIns="89274" tIns="44638" rIns="89274" bIns="44638" anchor="ctr"/>
+          <a:lstStyle/>
+          <a:p>
+            <a:pPr algn="ctr" defTabSz="446367" fontAlgn="base">
               <a:spcBef>
                 <a:spcPct val="0"/>
               </a:spcBef>
@@ -3479,7 +3479,7 @@
               </a:spcAft>
             </a:pPr>
             <a:r>
-              <a:rPr lang="en-US" sz="1050" b="1" dirty="0">
+              <a:rPr lang="en-US" sz="900" b="1" dirty="0">
                 <a:ea typeface="ＭＳ Ｐゴシック" pitchFamily="34" charset="-128"/>
                 <a:cs typeface="Calibri" pitchFamily="34" charset="0"/>
               </a:rPr>
@@ -3496,8 +3496,8 @@
         </p:nvSpPr>
         <p:spPr>
           <a:xfrm>
-            <a:off x="5829300" y="7933989"/>
-            <a:ext cx="700607" cy="477817"/>
+            <a:off x="5670926" y="7771228"/>
+            <a:ext cx="681571" cy="468014"/>
           </a:xfrm>
           <a:prstGeom prst="roundRect">
             <a:avLst/>
@@ -3518,10 +3518,10 @@
           <a:effectLst/>
         </p:spPr>
         <p:txBody>
-          <a:bodyPr lIns="91434" tIns="45717" rIns="91434" bIns="45717" anchor="ctr"/>
-          <a:lstStyle/>
-          <a:p>
-            <a:pPr algn="ctr" defTabSz="457169" fontAlgn="base">
+          <a:bodyPr lIns="89274" tIns="44638" rIns="89274" bIns="44638" anchor="ctr"/>
+          <a:lstStyle/>
+          <a:p>
+            <a:pPr algn="ctr" defTabSz="446367" fontAlgn="base">
               <a:spcBef>
                 <a:spcPct val="0"/>
               </a:spcBef>
@@ -3530,7 +3530,7 @@
               </a:spcAft>
             </a:pPr>
             <a:r>
-              <a:rPr lang="en-US" sz="1050" b="1" i="1" dirty="0">
+              <a:rPr lang="en-US" sz="900" b="1" i="1" dirty="0">
                 <a:ea typeface="ＭＳ Ｐゴシック" pitchFamily="34" charset="-128"/>
                 <a:cs typeface="Calibri" pitchFamily="34" charset="0"/>
               </a:rPr>
@@ -3547,8 +3547,8 @@
         </p:nvSpPr>
         <p:spPr>
           <a:xfrm>
-            <a:off x="1043505" y="6938059"/>
-            <a:ext cx="1371600" cy="762000"/>
+            <a:off x="1015155" y="6795728"/>
+            <a:ext cx="1334335" cy="746367"/>
           </a:xfrm>
           <a:prstGeom prst="roundRect">
             <a:avLst/>
@@ -3569,10 +3569,10 @@
           <a:effectLst/>
         </p:spPr>
         <p:txBody>
-          <a:bodyPr lIns="91434" tIns="45717" rIns="91434" bIns="45717" anchor="ctr"/>
-          <a:lstStyle/>
-          <a:p>
-            <a:pPr algn="ctr" defTabSz="457169" fontAlgn="base">
+          <a:bodyPr lIns="89274" tIns="44638" rIns="89274" bIns="44638" anchor="ctr"/>
+          <a:lstStyle/>
+          <a:p>
+            <a:pPr algn="ctr" defTabSz="446367" fontAlgn="base">
               <a:spcBef>
                 <a:spcPct val="0"/>
               </a:spcBef>
@@ -3581,7 +3581,7 @@
               </a:spcAft>
             </a:pPr>
             <a:r>
-              <a:rPr lang="en-US" sz="1050" b="1" dirty="0">
+              <a:rPr lang="en-US" sz="900" b="1" dirty="0">
                 <a:ea typeface="ＭＳ Ｐゴシック" pitchFamily="34" charset="-128"/>
                 <a:cs typeface="Calibri" pitchFamily="34" charset="0"/>
               </a:rPr>
@@ -3598,8 +3598,8 @@
         </p:nvSpPr>
         <p:spPr>
           <a:xfrm>
-            <a:off x="4205805" y="6998621"/>
-            <a:ext cx="1371600" cy="640876"/>
+            <a:off x="4091541" y="6855047"/>
+            <a:ext cx="1334335" cy="627729"/>
           </a:xfrm>
           <a:prstGeom prst="roundRect">
             <a:avLst/>
@@ -3620,10 +3620,10 @@
           <a:effectLst/>
         </p:spPr>
         <p:txBody>
-          <a:bodyPr lIns="91434" tIns="45717" rIns="91434" bIns="45717" anchor="ctr"/>
-          <a:lstStyle/>
-          <a:p>
-            <a:pPr algn="ctr" defTabSz="457169" fontAlgn="base">
+          <a:bodyPr lIns="89274" tIns="44638" rIns="89274" bIns="44638" anchor="ctr"/>
+          <a:lstStyle/>
+          <a:p>
+            <a:pPr algn="ctr" defTabSz="446367" fontAlgn="base">
               <a:spcBef>
                 <a:spcPct val="0"/>
               </a:spcBef>
@@ -3632,7 +3632,7 @@
               </a:spcAft>
             </a:pPr>
             <a:r>
-              <a:rPr lang="en-US" sz="1050" b="1" dirty="0">
+              <a:rPr lang="en-US" sz="900" b="1" dirty="0">
                 <a:ea typeface="ＭＳ Ｐゴシック" pitchFamily="34" charset="-128"/>
                 <a:cs typeface="Calibri" pitchFamily="34" charset="0"/>
               </a:rPr>
@@ -3649,8 +3649,8 @@
         </p:nvSpPr>
         <p:spPr>
           <a:xfrm>
-            <a:off x="1043505" y="590996"/>
-            <a:ext cx="1371600" cy="990601"/>
+            <a:off x="1015155" y="578874"/>
+            <a:ext cx="1334335" cy="970279"/>
           </a:xfrm>
           <a:prstGeom prst="roundRect">
             <a:avLst/>
@@ -3671,10 +3671,10 @@
           <a:effectLst/>
         </p:spPr>
         <p:txBody>
-          <a:bodyPr lIns="91434" tIns="45717" rIns="91434" bIns="45717" anchor="ctr"/>
-          <a:lstStyle/>
-          <a:p>
-            <a:pPr algn="ctr" defTabSz="457169" fontAlgn="base">
+          <a:bodyPr lIns="89274" tIns="44638" rIns="89274" bIns="44638" anchor="ctr"/>
+          <a:lstStyle/>
+          <a:p>
+            <a:pPr algn="ctr" defTabSz="446367" fontAlgn="base">
               <a:spcBef>
                 <a:spcPct val="0"/>
               </a:spcBef>
@@ -3684,7 +3684,7 @@
               <a:defRPr/>
             </a:pPr>
             <a:r>
-              <a:rPr lang="en-US" sz="1050" b="1" dirty="0" smtClean="0">
+              <a:rPr lang="en-US" sz="900" b="1" dirty="0" smtClean="0">
                 <a:ea typeface="ＭＳ Ｐゴシック" pitchFamily="34" charset="-128"/>
                 <a:cs typeface="Calibri" pitchFamily="34" charset="0"/>
               </a:rPr>
@@ -3692,7 +3692,7 @@
             </a:r>
           </a:p>
           <a:p>
-            <a:pPr algn="ctr" defTabSz="457169" fontAlgn="base">
+            <a:pPr algn="ctr" defTabSz="446367" fontAlgn="base">
               <a:spcBef>
                 <a:spcPct val="0"/>
               </a:spcBef>
@@ -3701,7 +3701,7 @@
               </a:spcAft>
               <a:defRPr/>
             </a:pPr>
-            <a:endParaRPr lang="en-US" sz="1050" b="1" dirty="0">
+            <a:endParaRPr lang="en-US" sz="900" b="1" dirty="0">
               <a:solidFill>
                 <a:prstClr val="white"/>
               </a:solidFill>
@@ -3710,7 +3710,7 @@
             </a:endParaRPr>
           </a:p>
           <a:p>
-            <a:pPr algn="ctr" defTabSz="457169" fontAlgn="base">
+            <a:pPr algn="ctr" defTabSz="446367" fontAlgn="base">
               <a:spcBef>
                 <a:spcPct val="0"/>
               </a:spcBef>
@@ -3720,7 +3720,7 @@
               <a:defRPr/>
             </a:pPr>
             <a:r>
-              <a:rPr lang="en-US" sz="1050" b="1" i="1" dirty="0">
+              <a:rPr lang="en-US" sz="900" b="1" i="1" dirty="0">
                 <a:solidFill>
                   <a:schemeClr val="tx2">
                     <a:lumMod val="40000"/>
@@ -3743,8 +3743,8 @@
         </p:nvSpPr>
         <p:spPr>
           <a:xfrm>
-            <a:off x="1043505" y="4591497"/>
-            <a:ext cx="1371600" cy="609600"/>
+            <a:off x="1015155" y="4497304"/>
+            <a:ext cx="1334335" cy="597094"/>
           </a:xfrm>
           <a:prstGeom prst="roundRect">
             <a:avLst/>
@@ -3765,10 +3765,10 @@
           <a:effectLst/>
         </p:spPr>
         <p:txBody>
-          <a:bodyPr lIns="91434" tIns="45717" rIns="91434" bIns="45717" anchor="ctr"/>
-          <a:lstStyle/>
-          <a:p>
-            <a:pPr algn="ctr" defTabSz="457169" fontAlgn="base">
+          <a:bodyPr lIns="89274" tIns="44638" rIns="89274" bIns="44638" anchor="ctr"/>
+          <a:lstStyle/>
+          <a:p>
+            <a:pPr algn="ctr" defTabSz="446367" fontAlgn="base">
               <a:spcBef>
                 <a:spcPct val="0"/>
               </a:spcBef>
@@ -3777,7 +3777,7 @@
               </a:spcAft>
             </a:pPr>
             <a:r>
-              <a:rPr lang="en-US" sz="1050" b="1" dirty="0">
+              <a:rPr lang="en-US" sz="900" b="1" dirty="0">
                 <a:ea typeface="ＭＳ Ｐゴシック" pitchFamily="34" charset="-128"/>
                 <a:cs typeface="Calibri" pitchFamily="34" charset="0"/>
               </a:rPr>
@@ -3794,8 +3794,8 @@
         </p:nvSpPr>
         <p:spPr>
           <a:xfrm>
-            <a:off x="2643705" y="2738389"/>
-            <a:ext cx="1371600" cy="633907"/>
+            <a:off x="2571881" y="2682214"/>
+            <a:ext cx="1334335" cy="620902"/>
           </a:xfrm>
           <a:prstGeom prst="roundRect">
             <a:avLst/>
@@ -3816,10 +3816,10 @@
           <a:effectLst/>
         </p:spPr>
         <p:txBody>
-          <a:bodyPr lIns="91434" tIns="45717" rIns="91434" bIns="45717" anchor="ctr"/>
-          <a:lstStyle/>
-          <a:p>
-            <a:pPr algn="ctr" defTabSz="457169" fontAlgn="base">
+          <a:bodyPr lIns="89274" tIns="44638" rIns="89274" bIns="44638" anchor="ctr"/>
+          <a:lstStyle/>
+          <a:p>
+            <a:pPr algn="ctr" defTabSz="446367" fontAlgn="base">
               <a:spcBef>
                 <a:spcPct val="0"/>
               </a:spcBef>
@@ -3828,7 +3828,7 @@
               </a:spcAft>
             </a:pPr>
             <a:r>
-              <a:rPr lang="en-US" sz="1050" b="1" dirty="0">
+              <a:rPr lang="en-US" sz="900" b="1" dirty="0">
                 <a:ea typeface="ＭＳ Ｐゴシック" pitchFamily="34" charset="-128"/>
                 <a:cs typeface="Calibri" pitchFamily="34" charset="0"/>
               </a:rPr>
@@ -3845,8 +3845,8 @@
         </p:nvSpPr>
         <p:spPr>
           <a:xfrm>
-            <a:off x="1043505" y="3524697"/>
-            <a:ext cx="1371600" cy="945109"/>
+            <a:off x="1015155" y="3452392"/>
+            <a:ext cx="1334335" cy="925719"/>
           </a:xfrm>
           <a:prstGeom prst="roundRect">
             <a:avLst/>
@@ -3868,10 +3868,10 @@
           <a:effectLst/>
         </p:spPr>
         <p:txBody>
-          <a:bodyPr lIns="91434" tIns="45717" rIns="91434" bIns="45717" anchor="ctr"/>
-          <a:lstStyle/>
-          <a:p>
-            <a:pPr algn="ctr" defTabSz="457169" fontAlgn="base">
+          <a:bodyPr lIns="89274" tIns="44638" rIns="89274" bIns="44638" anchor="ctr"/>
+          <a:lstStyle/>
+          <a:p>
+            <a:pPr algn="ctr" defTabSz="446367" fontAlgn="base">
               <a:spcBef>
                 <a:spcPct val="0"/>
               </a:spcBef>
@@ -3880,7 +3880,7 @@
               </a:spcAft>
             </a:pPr>
             <a:r>
-              <a:rPr lang="en-US" sz="1050" b="1" i="1" dirty="0">
+              <a:rPr lang="en-US" sz="900" b="1" i="1" dirty="0">
                 <a:solidFill>
                   <a:schemeClr val="tx2">
                     <a:lumMod val="40000"/>
@@ -3893,7 +3893,7 @@
               <a:t>4</a:t>
             </a:r>
             <a:r>
-              <a:rPr lang="en-US" sz="1050" b="1" i="1" dirty="0" smtClean="0">
+              <a:rPr lang="en-US" sz="900" b="1" i="1" dirty="0" smtClean="0">
                 <a:solidFill>
                   <a:schemeClr val="tx2">
                     <a:lumMod val="40000"/>
@@ -3907,7 +3907,7 @@
             </a:r>
           </a:p>
           <a:p>
-            <a:pPr algn="ctr" defTabSz="457169" fontAlgn="base">
+            <a:pPr algn="ctr" defTabSz="446367" fontAlgn="base">
               <a:spcBef>
                 <a:spcPct val="0"/>
               </a:spcBef>
@@ -3916,41 +3916,41 @@
               </a:spcAft>
             </a:pPr>
             <a:r>
-              <a:rPr lang="en-US" sz="1050" b="1" dirty="0" smtClean="0">
+              <a:rPr lang="en-US" sz="900" b="1" dirty="0" smtClean="0">
                 <a:ea typeface="ＭＳ Ｐゴシック" pitchFamily="34" charset="-128"/>
                 <a:cs typeface="Calibri" pitchFamily="34" charset="0"/>
               </a:rPr>
               <a:t>Form </a:t>
             </a:r>
             <a:r>
-              <a:rPr lang="en-US" sz="1050" b="1" dirty="0">
+              <a:rPr lang="en-US" sz="900" b="1" dirty="0">
                 <a:ea typeface="ＭＳ Ｐゴシック" pitchFamily="34" charset="-128"/>
                 <a:cs typeface="Calibri" pitchFamily="34" charset="0"/>
               </a:rPr>
               <a:t>is </a:t>
             </a:r>
             <a:r>
-              <a:rPr lang="en-US" sz="1050" b="1" dirty="0" smtClean="0">
+              <a:rPr lang="en-US" sz="900" b="1" dirty="0" smtClean="0">
                 <a:ea typeface="ＭＳ Ｐゴシック" pitchFamily="34" charset="-128"/>
                 <a:cs typeface="Calibri" pitchFamily="34" charset="0"/>
               </a:rPr>
               <a:t>auto-populated </a:t>
             </a:r>
             <a:r>
-              <a:rPr lang="en-US" sz="1050" b="1" dirty="0">
+              <a:rPr lang="en-US" sz="900" b="1" dirty="0">
                 <a:ea typeface="ＭＳ Ｐゴシック" pitchFamily="34" charset="-128"/>
                 <a:cs typeface="Calibri" pitchFamily="34" charset="0"/>
               </a:rPr>
               <a:t>with some EHR-derived </a:t>
             </a:r>
             <a:r>
-              <a:rPr lang="en-US" sz="1050" b="1" dirty="0" smtClean="0">
+              <a:rPr lang="en-US" sz="900" b="1" dirty="0" smtClean="0">
                 <a:ea typeface="ＭＳ Ｐゴシック" pitchFamily="34" charset="-128"/>
                 <a:cs typeface="Calibri" pitchFamily="34" charset="0"/>
               </a:rPr>
               <a:t>patient data</a:t>
             </a:r>
-            <a:endParaRPr lang="en-US" sz="1050" b="1" dirty="0">
+            <a:endParaRPr lang="en-US" sz="900" b="1" dirty="0">
               <a:ea typeface="ＭＳ Ｐゴシック" pitchFamily="34" charset="-128"/>
               <a:cs typeface="Calibri" pitchFamily="34" charset="0"/>
             </a:endParaRPr>
@@ -3965,8 +3965,8 @@
         </p:nvSpPr>
         <p:spPr>
           <a:xfrm>
-            <a:off x="2643705" y="705297"/>
-            <a:ext cx="1371600" cy="762000"/>
+            <a:off x="2571881" y="690830"/>
+            <a:ext cx="1334335" cy="746367"/>
           </a:xfrm>
           <a:prstGeom prst="roundRect">
             <a:avLst/>
@@ -3987,10 +3987,10 @@
           <a:effectLst/>
         </p:spPr>
         <p:txBody>
-          <a:bodyPr lIns="91434" tIns="45717" rIns="91434" bIns="45717" anchor="ctr"/>
-          <a:lstStyle/>
-          <a:p>
-            <a:pPr algn="ctr" defTabSz="457169" fontAlgn="base">
+          <a:bodyPr lIns="89274" tIns="44638" rIns="89274" bIns="44638" anchor="ctr"/>
+          <a:lstStyle/>
+          <a:p>
+            <a:pPr algn="ctr" defTabSz="446367" fontAlgn="base">
               <a:spcBef>
                 <a:spcPct val="0"/>
               </a:spcBef>
@@ -4000,13 +4000,13 @@
               <a:defRPr/>
             </a:pPr>
             <a:r>
-              <a:rPr lang="en-US" sz="1050" b="1" dirty="0" smtClean="0">
+              <a:rPr lang="en-US" sz="900" b="1" dirty="0" smtClean="0">
                 <a:ea typeface="ＭＳ Ｐゴシック" pitchFamily="34" charset="-128"/>
                 <a:cs typeface="Calibri" pitchFamily="34" charset="0"/>
               </a:rPr>
               <a:t>2. Form/Template repository receives request for form/template</a:t>
             </a:r>
-            <a:endParaRPr lang="en-US" sz="1050" b="1" dirty="0">
+            <a:endParaRPr lang="en-US" sz="900" b="1" dirty="0">
               <a:ea typeface="ＭＳ Ｐゴシック" pitchFamily="34" charset="-128"/>
               <a:cs typeface="Calibri" pitchFamily="34" charset="0"/>
             </a:endParaRPr>
@@ -4021,8 +4021,8 @@
         </p:nvSpPr>
         <p:spPr>
           <a:xfrm>
-            <a:off x="4205805" y="7791897"/>
-            <a:ext cx="1371600" cy="762000"/>
+            <a:off x="4091541" y="7632051"/>
+            <a:ext cx="1334335" cy="746367"/>
           </a:xfrm>
           <a:prstGeom prst="roundRect">
             <a:avLst/>
@@ -4043,10 +4043,10 @@
           <a:effectLst/>
         </p:spPr>
         <p:txBody>
-          <a:bodyPr lIns="91434" tIns="45717" rIns="91434" bIns="45717" anchor="ctr"/>
-          <a:lstStyle/>
-          <a:p>
-            <a:pPr algn="ctr" defTabSz="457169" fontAlgn="base">
+          <a:bodyPr lIns="89274" tIns="44638" rIns="89274" bIns="44638" anchor="ctr"/>
+          <a:lstStyle/>
+          <a:p>
+            <a:pPr algn="ctr" defTabSz="446367" fontAlgn="base">
               <a:spcBef>
                 <a:spcPct val="0"/>
               </a:spcBef>
@@ -4055,7 +4055,7 @@
               </a:spcAft>
             </a:pPr>
             <a:r>
-              <a:rPr lang="en-US" sz="1050" b="1" dirty="0">
+              <a:rPr lang="en-US" sz="900" b="1" dirty="0">
                 <a:ea typeface="ＭＳ Ｐゴシック" pitchFamily="34" charset="-128"/>
                 <a:cs typeface="Calibri" pitchFamily="34" charset="0"/>
               </a:rPr>
@@ -4075,14 +4075,14 @@
         </p:nvCxnSpPr>
         <p:spPr>
           <a:xfrm flipV="1">
-            <a:off x="2415105" y="1086297"/>
-            <a:ext cx="228600" cy="1"/>
+            <a:off x="2349491" y="1064013"/>
+            <a:ext cx="222390" cy="0"/>
           </a:xfrm>
           <a:prstGeom prst="straightConnector1">
             <a:avLst/>
           </a:prstGeom>
           <a:ln>
-            <a:tailEnd type="arrow"/>
+            <a:tailEnd type="triangle" w="med" len="sm"/>
           </a:ln>
         </p:spPr>
         <p:style>
@@ -4110,14 +4110,14 @@
         </p:nvCxnSpPr>
         <p:spPr>
           <a:xfrm>
-            <a:off x="3329505" y="2509789"/>
-            <a:ext cx="0" cy="228601"/>
+            <a:off x="3239047" y="2458303"/>
+            <a:ext cx="0" cy="223911"/>
           </a:xfrm>
           <a:prstGeom prst="straightConnector1">
             <a:avLst/>
           </a:prstGeom>
           <a:ln>
-            <a:tailEnd type="arrow"/>
+            <a:tailEnd type="triangle" w="med" len="sm"/>
           </a:ln>
         </p:spPr>
         <p:style>
@@ -4146,14 +4146,14 @@
         </p:nvCxnSpPr>
         <p:spPr>
           <a:xfrm flipH="1">
-            <a:off x="2415105" y="3055343"/>
-            <a:ext cx="228600" cy="0"/>
+            <a:off x="2349491" y="2992665"/>
+            <a:ext cx="222390" cy="0"/>
           </a:xfrm>
           <a:prstGeom prst="straightConnector1">
             <a:avLst/>
           </a:prstGeom>
           <a:ln>
-            <a:tailEnd type="arrow"/>
+            <a:tailEnd type="triangle" w="med" len="sm"/>
           </a:ln>
         </p:spPr>
         <p:style>
@@ -4182,14 +4182,14 @@
         </p:nvCxnSpPr>
         <p:spPr>
           <a:xfrm>
-            <a:off x="1729305" y="4469805"/>
-            <a:ext cx="0" cy="121691"/>
+            <a:off x="1682321" y="4378110"/>
+            <a:ext cx="0" cy="119194"/>
           </a:xfrm>
           <a:prstGeom prst="straightConnector1">
             <a:avLst/>
           </a:prstGeom>
           <a:ln>
-            <a:tailEnd type="arrow"/>
+            <a:tailEnd type="triangle" w="med" len="sm"/>
           </a:ln>
         </p:spPr>
         <p:style>
@@ -4218,14 +4218,14 @@
         </p:nvCxnSpPr>
         <p:spPr>
           <a:xfrm>
-            <a:off x="1729305" y="5201097"/>
-            <a:ext cx="0" cy="152400"/>
+            <a:off x="1682321" y="5094398"/>
+            <a:ext cx="0" cy="149273"/>
           </a:xfrm>
           <a:prstGeom prst="straightConnector1">
             <a:avLst/>
           </a:prstGeom>
           <a:ln>
-            <a:tailEnd type="arrow"/>
+            <a:tailEnd type="triangle" w="med" len="sm"/>
           </a:ln>
         </p:spPr>
         <p:style>
@@ -4254,14 +4254,14 @@
         </p:nvCxnSpPr>
         <p:spPr>
           <a:xfrm>
-            <a:off x="1729305" y="5963097"/>
-            <a:ext cx="0" cy="152400"/>
+            <a:off x="1682321" y="5840767"/>
+            <a:ext cx="0" cy="149273"/>
           </a:xfrm>
           <a:prstGeom prst="straightConnector1">
             <a:avLst/>
           </a:prstGeom>
           <a:ln>
-            <a:tailEnd type="arrow"/>
+            <a:tailEnd type="triangle" w="med" len="sm"/>
           </a:ln>
         </p:spPr>
         <p:style>
@@ -4290,14 +4290,14 @@
         </p:nvCxnSpPr>
         <p:spPr>
           <a:xfrm>
-            <a:off x="2415105" y="7319059"/>
-            <a:ext cx="1790700" cy="0"/>
+            <a:off x="2349492" y="7168911"/>
+            <a:ext cx="1742050" cy="0"/>
           </a:xfrm>
           <a:prstGeom prst="straightConnector1">
             <a:avLst/>
           </a:prstGeom>
           <a:ln>
-            <a:tailEnd type="arrow"/>
+            <a:tailEnd type="triangle" w="med" len="sm"/>
           </a:ln>
         </p:spPr>
         <p:style>
@@ -4326,14 +4326,14 @@
         </p:nvCxnSpPr>
         <p:spPr>
           <a:xfrm>
-            <a:off x="4891605" y="7639497"/>
-            <a:ext cx="0" cy="152400"/>
+            <a:off x="4758707" y="7482776"/>
+            <a:ext cx="0" cy="149273"/>
           </a:xfrm>
           <a:prstGeom prst="straightConnector1">
             <a:avLst/>
           </a:prstGeom>
           <a:ln>
-            <a:tailEnd type="arrow"/>
+            <a:tailEnd type="triangle" w="med" len="sm"/>
           </a:ln>
         </p:spPr>
         <p:style>
@@ -4362,14 +4362,14 @@
         </p:nvCxnSpPr>
         <p:spPr>
           <a:xfrm>
-            <a:off x="5577407" y="8172896"/>
-            <a:ext cx="251893" cy="0"/>
+            <a:off x="5425877" y="8005232"/>
+            <a:ext cx="245049" cy="0"/>
           </a:xfrm>
           <a:prstGeom prst="straightConnector1">
             <a:avLst/>
           </a:prstGeom>
           <a:ln>
-            <a:tailEnd type="arrow"/>
+            <a:tailEnd type="triangle" w="med" len="sm"/>
           </a:ln>
         </p:spPr>
         <p:style>
@@ -4395,8 +4395,8 @@
         </p:nvSpPr>
         <p:spPr>
           <a:xfrm>
-            <a:off x="1043505" y="2738389"/>
-            <a:ext cx="1371600" cy="633907"/>
+            <a:off x="1015155" y="2682214"/>
+            <a:ext cx="1334335" cy="620902"/>
           </a:xfrm>
           <a:prstGeom prst="roundRect">
             <a:avLst/>
@@ -4417,10 +4417,10 @@
           <a:effectLst/>
         </p:spPr>
         <p:txBody>
-          <a:bodyPr lIns="91434" tIns="45717" rIns="91434" bIns="45717" anchor="ctr"/>
-          <a:lstStyle/>
-          <a:p>
-            <a:pPr algn="ctr" defTabSz="457169" fontAlgn="base">
+          <a:bodyPr lIns="89274" tIns="44638" rIns="89274" bIns="44638" anchor="ctr"/>
+          <a:lstStyle/>
+          <a:p>
+            <a:pPr algn="ctr" defTabSz="446367" fontAlgn="base">
               <a:spcBef>
                 <a:spcPct val="0"/>
               </a:spcBef>
@@ -4429,7 +4429,7 @@
               </a:spcAft>
             </a:pPr>
             <a:r>
-              <a:rPr lang="en-US" sz="1050" b="1" dirty="0">
+              <a:rPr lang="en-US" sz="900" b="1" dirty="0">
                 <a:ea typeface="ＭＳ Ｐゴシック" pitchFamily="34" charset="-128"/>
                 <a:cs typeface="Calibri" pitchFamily="34" charset="0"/>
               </a:rPr>
@@ -4449,14 +4449,14 @@
         </p:nvCxnSpPr>
         <p:spPr>
           <a:xfrm>
-            <a:off x="1729305" y="3372297"/>
-            <a:ext cx="0" cy="152400"/>
+            <a:off x="1682321" y="3303115"/>
+            <a:ext cx="0" cy="149273"/>
           </a:xfrm>
           <a:prstGeom prst="straightConnector1">
             <a:avLst/>
           </a:prstGeom>
           <a:ln>
-            <a:tailEnd type="arrow"/>
+            <a:tailEnd type="triangle" w="med" len="sm"/>
           </a:ln>
         </p:spPr>
         <p:style>
@@ -4482,8 +4482,8 @@
         </p:nvSpPr>
         <p:spPr>
           <a:xfrm>
-            <a:off x="2643705" y="1619698"/>
-            <a:ext cx="1371600" cy="945109"/>
+            <a:off x="2571881" y="1586473"/>
+            <a:ext cx="1334335" cy="925719"/>
           </a:xfrm>
           <a:prstGeom prst="roundRect">
             <a:avLst/>
@@ -4505,10 +4505,10 @@
           <a:effectLst/>
         </p:spPr>
         <p:txBody>
-          <a:bodyPr lIns="91434" tIns="45717" rIns="91434" bIns="45717" anchor="ctr"/>
-          <a:lstStyle/>
-          <a:p>
-            <a:pPr algn="ctr" defTabSz="457169" fontAlgn="base">
+          <a:bodyPr lIns="89274" tIns="44638" rIns="89274" bIns="44638" anchor="ctr"/>
+          <a:lstStyle/>
+          <a:p>
+            <a:pPr algn="ctr" defTabSz="446367" fontAlgn="base">
               <a:spcBef>
                 <a:spcPct val="0"/>
               </a:spcBef>
@@ -4517,7 +4517,7 @@
               </a:spcAft>
             </a:pPr>
             <a:r>
-              <a:rPr lang="en-US" sz="1050" b="1" i="1" dirty="0">
+              <a:rPr lang="en-US" sz="900" b="1" i="1" dirty="0">
                 <a:solidFill>
                   <a:schemeClr val="tx2">
                     <a:lumMod val="40000"/>
@@ -4530,7 +4530,7 @@
               <a:t>2</a:t>
             </a:r>
             <a:r>
-              <a:rPr lang="en-US" sz="1050" b="1" i="1" dirty="0" smtClean="0">
+              <a:rPr lang="en-US" sz="900" b="1" i="1" dirty="0" smtClean="0">
                 <a:solidFill>
                   <a:schemeClr val="tx2">
                     <a:lumMod val="40000"/>
@@ -4544,7 +4544,7 @@
             </a:r>
           </a:p>
           <a:p>
-            <a:pPr algn="ctr" defTabSz="457169" fontAlgn="base">
+            <a:pPr algn="ctr" defTabSz="446367" fontAlgn="base">
               <a:spcBef>
                 <a:spcPct val="0"/>
               </a:spcBef>
@@ -4553,41 +4553,41 @@
               </a:spcAft>
             </a:pPr>
             <a:r>
-              <a:rPr lang="en-US" sz="1050" b="1" dirty="0" smtClean="0">
+              <a:rPr lang="en-US" sz="900" b="1" dirty="0" smtClean="0">
                 <a:ea typeface="ＭＳ Ｐゴシック" pitchFamily="34" charset="-128"/>
                 <a:cs typeface="Calibri" pitchFamily="34" charset="0"/>
               </a:rPr>
               <a:t>Form </a:t>
             </a:r>
             <a:r>
-              <a:rPr lang="en-US" sz="1050" b="1" dirty="0">
+              <a:rPr lang="en-US" sz="900" b="1" dirty="0">
                 <a:ea typeface="ＭＳ Ｐゴシック" pitchFamily="34" charset="-128"/>
                 <a:cs typeface="Calibri" pitchFamily="34" charset="0"/>
               </a:rPr>
               <a:t>is </a:t>
             </a:r>
             <a:r>
-              <a:rPr lang="en-US" sz="1050" b="1" dirty="0" smtClean="0">
+              <a:rPr lang="en-US" sz="900" b="1" dirty="0" smtClean="0">
                 <a:ea typeface="ＭＳ Ｐゴシック" pitchFamily="34" charset="-128"/>
                 <a:cs typeface="Calibri" pitchFamily="34" charset="0"/>
               </a:rPr>
               <a:t>pre-populated </a:t>
             </a:r>
             <a:r>
-              <a:rPr lang="en-US" sz="1050" b="1" dirty="0">
+              <a:rPr lang="en-US" sz="900" b="1" dirty="0">
                 <a:ea typeface="ＭＳ Ｐゴシック" pitchFamily="34" charset="-128"/>
                 <a:cs typeface="Calibri" pitchFamily="34" charset="0"/>
               </a:rPr>
               <a:t>with some </a:t>
             </a:r>
             <a:r>
-              <a:rPr lang="en-US" sz="1050" b="1" dirty="0" smtClean="0">
+              <a:rPr lang="en-US" sz="900" b="1" dirty="0" smtClean="0">
                 <a:ea typeface="ＭＳ Ｐゴシック" pitchFamily="34" charset="-128"/>
                 <a:cs typeface="Calibri" pitchFamily="34" charset="0"/>
               </a:rPr>
               <a:t>EHR-provided patient data</a:t>
             </a:r>
-            <a:endParaRPr lang="en-US" sz="1050" b="1" dirty="0">
+            <a:endParaRPr lang="en-US" sz="900" b="1" dirty="0">
               <a:ea typeface="ＭＳ Ｐゴシック" pitchFamily="34" charset="-128"/>
               <a:cs typeface="Calibri" pitchFamily="34" charset="0"/>
             </a:endParaRPr>
@@ -4605,14 +4605,14 @@
         </p:nvCxnSpPr>
         <p:spPr>
           <a:xfrm>
-            <a:off x="3329505" y="1467297"/>
-            <a:ext cx="0" cy="152400"/>
+            <a:off x="3239047" y="1437196"/>
+            <a:ext cx="0" cy="149273"/>
           </a:xfrm>
           <a:prstGeom prst="straightConnector1">
             <a:avLst/>
           </a:prstGeom>
           <a:ln>
-            <a:tailEnd type="arrow"/>
+            <a:tailEnd type="triangle" w="med" len="sm"/>
           </a:ln>
         </p:spPr>
         <p:style>
@@ -4638,8 +4638,8 @@
         </p:nvSpPr>
         <p:spPr>
           <a:xfrm>
-            <a:off x="1043505" y="6115497"/>
-            <a:ext cx="1371600" cy="609600"/>
+            <a:off x="1015155" y="5990041"/>
+            <a:ext cx="1334335" cy="597094"/>
           </a:xfrm>
           <a:prstGeom prst="roundRect">
             <a:avLst/>
@@ -4661,10 +4661,10 @@
           <a:effectLst/>
         </p:spPr>
         <p:txBody>
-          <a:bodyPr lIns="91434" tIns="45717" rIns="91434" bIns="45717" anchor="ctr"/>
-          <a:lstStyle/>
-          <a:p>
-            <a:pPr algn="ctr" defTabSz="457169" fontAlgn="base">
+          <a:bodyPr lIns="89274" tIns="44638" rIns="89274" bIns="44638" anchor="ctr"/>
+          <a:lstStyle/>
+          <a:p>
+            <a:pPr algn="ctr" defTabSz="446367" fontAlgn="base">
               <a:spcBef>
                 <a:spcPct val="0"/>
               </a:spcBef>
@@ -4674,7 +4674,7 @@
               <a:defRPr/>
             </a:pPr>
             <a:r>
-              <a:rPr lang="en-US" sz="1050" b="1" i="1" dirty="0">
+              <a:rPr lang="en-US" sz="900" b="1" i="1" dirty="0">
                 <a:solidFill>
                   <a:schemeClr val="tx2">
                     <a:lumMod val="40000"/>
@@ -4700,14 +4700,14 @@
         </p:nvCxnSpPr>
         <p:spPr>
           <a:xfrm>
-            <a:off x="1729305" y="6725095"/>
-            <a:ext cx="0" cy="212963"/>
+            <a:off x="1682321" y="6587132"/>
+            <a:ext cx="0" cy="208594"/>
           </a:xfrm>
           <a:prstGeom prst="straightConnector1">
             <a:avLst/>
           </a:prstGeom>
           <a:ln>
-            <a:tailEnd type="arrow"/>
+            <a:tailEnd type="triangle" w="med" len="sm"/>
           </a:ln>
         </p:spPr>
         <p:style>
@@ -4733,8 +4733,8 @@
         </p:nvSpPr>
         <p:spPr>
           <a:xfrm>
-            <a:off x="114300" y="847389"/>
-            <a:ext cx="700607" cy="477817"/>
+            <a:off x="111197" y="830006"/>
+            <a:ext cx="681571" cy="468014"/>
           </a:xfrm>
           <a:prstGeom prst="roundRect">
             <a:avLst/>
@@ -4755,10 +4755,10 @@
           <a:effectLst/>
         </p:spPr>
         <p:txBody>
-          <a:bodyPr lIns="91434" tIns="45717" rIns="91434" bIns="45717" anchor="ctr"/>
-          <a:lstStyle/>
-          <a:p>
-            <a:pPr algn="ctr" defTabSz="457169" fontAlgn="base">
+          <a:bodyPr lIns="89274" tIns="44638" rIns="89274" bIns="44638" anchor="ctr"/>
+          <a:lstStyle/>
+          <a:p>
+            <a:pPr algn="ctr" defTabSz="446367" fontAlgn="base">
               <a:spcBef>
                 <a:spcPct val="0"/>
               </a:spcBef>
@@ -4767,14 +4767,14 @@
               </a:spcAft>
             </a:pPr>
             <a:r>
-              <a:rPr lang="en-US" sz="1050" b="1" i="1" dirty="0" smtClean="0">
+              <a:rPr lang="en-US" sz="900" b="1" i="1" dirty="0" smtClean="0">
                 <a:ea typeface="ＭＳ Ｐゴシック" pitchFamily="34" charset="-128"/>
                 <a:cs typeface="Calibri" pitchFamily="34" charset="0"/>
               </a:rPr>
               <a:t>Start </a:t>
             </a:r>
             <a:r>
-              <a:rPr lang="en-US" sz="1050" b="1" i="1" dirty="0">
+              <a:rPr lang="en-US" sz="900" b="1" i="1" dirty="0">
                 <a:ea typeface="ＭＳ Ｐゴシック" pitchFamily="34" charset="-128"/>
                 <a:cs typeface="Calibri" pitchFamily="34" charset="0"/>
               </a:rPr>
@@ -4794,14 +4794,14 @@
         </p:nvCxnSpPr>
         <p:spPr>
           <a:xfrm>
-            <a:off x="814905" y="1086297"/>
-            <a:ext cx="228600" cy="0"/>
+            <a:off x="792765" y="1064013"/>
+            <a:ext cx="222390" cy="0"/>
           </a:xfrm>
           <a:prstGeom prst="straightConnector1">
             <a:avLst/>
           </a:prstGeom>
           <a:ln>
-            <a:tailEnd type="arrow"/>
+            <a:tailEnd type="triangle" w="med" len="sm"/>
           </a:ln>
         </p:spPr>
         <p:style>
@@ -4822,7 +4822,7 @@
     </p:spTree>
     <p:extLst>
       <p:ext uri="{BB962C8B-B14F-4D97-AF65-F5344CB8AC3E}">
-        <p14:creationId xmlns:p14="http://schemas.microsoft.com/office/powerpoint/2010/main" xmlns="" val="779856399"/>
+        <p14:creationId xmlns="" xmlns:p14="http://schemas.microsoft.com/office/powerpoint/2010/main" val="779856399"/>
       </p:ext>
     </p:extLst>
   </p:cSld>
@@ -5118,12 +5118,9 @@
 </file>
 
 <file path=customXml/item1.xml><?xml version="1.0" encoding="utf-8"?>
-<?mso-contentType ?>
-<FormTemplates xmlns="http://schemas.microsoft.com/sharepoint/v3/contenttype/forms">
-  <Display>DocumentLibraryForm</Display>
-  <Edit>DocumentLibraryForm</Edit>
-  <New>DocumentLibraryForm</New>
-</FormTemplates>
+<p:properties xmlns:p="http://schemas.microsoft.com/office/2006/metadata/properties" xmlns:xsi="http://www.w3.org/2001/XMLSchema-instance">
+  <documentManagement/>
+</p:properties>
 </file>
 
 <file path=customXml/item2.xml><?xml version="1.0" encoding="utf-8"?>
@@ -5176,15 +5173,24 @@
 </file>
 
 <file path=customXml/item3.xml><?xml version="1.0" encoding="utf-8"?>
-<p:properties xmlns:p="http://schemas.microsoft.com/office/2006/metadata/properties" xmlns:xsi="http://www.w3.org/2001/XMLSchema-instance">
-  <documentManagement/>
-</p:properties>
+<?mso-contentType ?>
+<FormTemplates xmlns="http://schemas.microsoft.com/sharepoint/v3/contenttype/forms">
+  <Display>DocumentLibraryForm</Display>
+  <Edit>DocumentLibraryForm</Edit>
+  <New>DocumentLibraryForm</New>
+</FormTemplates>
 </file>
 
 <file path=customXml/itemProps1.xml><?xml version="1.0" encoding="utf-8"?>
-<ds:datastoreItem xmlns:ds="http://schemas.openxmlformats.org/officeDocument/2006/customXml" ds:itemID="{93867DCD-913B-4BE7-B218-6A941DDB47CC}">
+<ds:datastoreItem xmlns:ds="http://schemas.openxmlformats.org/officeDocument/2006/customXml" ds:itemID="{AA05AFCB-176E-411D-8F54-3F7328DC8DF9}">
   <ds:schemaRefs>
-    <ds:schemaRef ds:uri="http://schemas.microsoft.com/sharepoint/v3/contenttype/forms"/>
+    <ds:schemaRef ds:uri="http://schemas.microsoft.com/office/2006/documentManagement/types"/>
+    <ds:schemaRef ds:uri="http://purl.org/dc/terms/"/>
+    <ds:schemaRef ds:uri="http://schemas.microsoft.com/office/2006/metadata/properties"/>
+    <ds:schemaRef ds:uri="http://purl.org/dc/dcmitype/"/>
+    <ds:schemaRef ds:uri="http://www.w3.org/XML/1998/namespace"/>
+    <ds:schemaRef ds:uri="http://schemas.openxmlformats.org/package/2006/metadata/core-properties"/>
+    <ds:schemaRef ds:uri="http://purl.org/dc/elements/1.1/"/>
   </ds:schemaRefs>
 </ds:datastoreItem>
 </file>
@@ -5205,15 +5211,9 @@
 </file>
 
 <file path=customXml/itemProps3.xml><?xml version="1.0" encoding="utf-8"?>
-<ds:datastoreItem xmlns:ds="http://schemas.openxmlformats.org/officeDocument/2006/customXml" ds:itemID="{AA05AFCB-176E-411D-8F54-3F7328DC8DF9}">
+<ds:datastoreItem xmlns:ds="http://schemas.openxmlformats.org/officeDocument/2006/customXml" ds:itemID="{93867DCD-913B-4BE7-B218-6A941DDB47CC}">
   <ds:schemaRefs>
-    <ds:schemaRef ds:uri="http://schemas.microsoft.com/office/2006/documentManagement/types"/>
-    <ds:schemaRef ds:uri="http://purl.org/dc/terms/"/>
-    <ds:schemaRef ds:uri="http://schemas.microsoft.com/office/2006/metadata/properties"/>
-    <ds:schemaRef ds:uri="http://purl.org/dc/dcmitype/"/>
-    <ds:schemaRef ds:uri="http://www.w3.org/XML/1998/namespace"/>
-    <ds:schemaRef ds:uri="http://schemas.openxmlformats.org/package/2006/metadata/core-properties"/>
-    <ds:schemaRef ds:uri="http://purl.org/dc/elements/1.1/"/>
+    <ds:schemaRef ds:uri="http://schemas.microsoft.com/sharepoint/v3/contenttype/forms"/>
   </ds:schemaRefs>
 </ds:datastoreItem>
 </file>
</xml_diff>